<commit_message>
Updates to gulpfile build
</commit_message>
<xml_diff>
--- a/SPFx ISV Insight.pptx
+++ b/SPFx ISV Insight.pptx
@@ -1860,13 +1860,6 @@
         </dgm:presLayoutVars>
       </dgm:prSet>
       <dgm:spPr/>
-      <dgm:t>
-        <a:bodyPr/>
-        <a:lstStyle/>
-        <a:p>
-          <a:endParaRPr lang="en-US"/>
-        </a:p>
-      </dgm:t>
     </dgm:pt>
     <dgm:pt modelId="{B7B4435E-04B3-45F7-B751-472B7DA342B1}" type="pres">
       <dgm:prSet presAssocID="{FE67F327-37A8-421F-80D2-D8BB6A405D3D}" presName="vertFlow" presStyleCnt="0"/>
@@ -1875,24 +1868,10 @@
     <dgm:pt modelId="{6B00C903-05B5-471C-9DF4-DFC1D15792BB}" type="pres">
       <dgm:prSet presAssocID="{FE67F327-37A8-421F-80D2-D8BB6A405D3D}" presName="header" presStyleLbl="node1" presStyleIdx="0" presStyleCnt="7"/>
       <dgm:spPr/>
-      <dgm:t>
-        <a:bodyPr/>
-        <a:lstStyle/>
-        <a:p>
-          <a:endParaRPr lang="en-US"/>
-        </a:p>
-      </dgm:t>
     </dgm:pt>
     <dgm:pt modelId="{AEDD776F-35F5-4A57-9386-10741FE545F9}" type="pres">
       <dgm:prSet presAssocID="{59FBBA1E-6745-4BAD-B0C5-38F0D15DFA94}" presName="parTrans" presStyleLbl="sibTrans2D1" presStyleIdx="0" presStyleCnt="13"/>
       <dgm:spPr/>
-      <dgm:t>
-        <a:bodyPr/>
-        <a:lstStyle/>
-        <a:p>
-          <a:endParaRPr lang="en-US"/>
-        </a:p>
-      </dgm:t>
     </dgm:pt>
     <dgm:pt modelId="{31B46375-E2BC-44EB-A251-27286CAB3AE8}" type="pres">
       <dgm:prSet presAssocID="{5BB85F6E-5B49-4E14-AD3B-721F1E9A7B98}" presName="child" presStyleLbl="alignAccFollowNode1" presStyleIdx="0" presStyleCnt="13">
@@ -1902,24 +1881,10 @@
         </dgm:presLayoutVars>
       </dgm:prSet>
       <dgm:spPr/>
-      <dgm:t>
-        <a:bodyPr/>
-        <a:lstStyle/>
-        <a:p>
-          <a:endParaRPr lang="en-US"/>
-        </a:p>
-      </dgm:t>
     </dgm:pt>
     <dgm:pt modelId="{ACD3EA37-C567-4766-BEB0-036D36EA7D76}" type="pres">
       <dgm:prSet presAssocID="{2578AF2E-66D7-4C7E-9142-BB3A84B0166C}" presName="sibTrans" presStyleLbl="sibTrans2D1" presStyleIdx="1" presStyleCnt="13"/>
       <dgm:spPr/>
-      <dgm:t>
-        <a:bodyPr/>
-        <a:lstStyle/>
-        <a:p>
-          <a:endParaRPr lang="en-US"/>
-        </a:p>
-      </dgm:t>
     </dgm:pt>
     <dgm:pt modelId="{297A0CE2-FCEF-4E5D-A892-216C6819EDAB}" type="pres">
       <dgm:prSet presAssocID="{23D2D4DA-7BA3-4319-AD91-6BC5D763616B}" presName="child" presStyleLbl="alignAccFollowNode1" presStyleIdx="1" presStyleCnt="13">
@@ -1929,13 +1894,6 @@
         </dgm:presLayoutVars>
       </dgm:prSet>
       <dgm:spPr/>
-      <dgm:t>
-        <a:bodyPr/>
-        <a:lstStyle/>
-        <a:p>
-          <a:endParaRPr lang="en-US"/>
-        </a:p>
-      </dgm:t>
     </dgm:pt>
     <dgm:pt modelId="{D05340CD-7F92-49DB-8389-DE1FBC4CC64D}" type="pres">
       <dgm:prSet presAssocID="{FE67F327-37A8-421F-80D2-D8BB6A405D3D}" presName="hSp" presStyleCnt="0"/>
@@ -1948,24 +1906,10 @@
     <dgm:pt modelId="{BAD4F5A8-74EF-4E3A-B4D3-DF1070CC1EB6}" type="pres">
       <dgm:prSet presAssocID="{97A6EA0E-6BC0-4F82-B5E2-B85E022FD4F6}" presName="header" presStyleLbl="node1" presStyleIdx="1" presStyleCnt="7"/>
       <dgm:spPr/>
-      <dgm:t>
-        <a:bodyPr/>
-        <a:lstStyle/>
-        <a:p>
-          <a:endParaRPr lang="en-US"/>
-        </a:p>
-      </dgm:t>
     </dgm:pt>
     <dgm:pt modelId="{4363144C-3FD5-4981-8BA6-0B86FC48CF79}" type="pres">
       <dgm:prSet presAssocID="{7CD28664-2FE9-49B5-91E4-995925399A49}" presName="parTrans" presStyleLbl="sibTrans2D1" presStyleIdx="2" presStyleCnt="13"/>
       <dgm:spPr/>
-      <dgm:t>
-        <a:bodyPr/>
-        <a:lstStyle/>
-        <a:p>
-          <a:endParaRPr lang="en-US"/>
-        </a:p>
-      </dgm:t>
     </dgm:pt>
     <dgm:pt modelId="{F8F0C2EE-8A35-46BE-9E91-A07FA7170E71}" type="pres">
       <dgm:prSet presAssocID="{4F133D7B-C499-4B8F-BE67-32F9E439FB0E}" presName="child" presStyleLbl="alignAccFollowNode1" presStyleIdx="2" presStyleCnt="13">
@@ -1975,24 +1919,10 @@
         </dgm:presLayoutVars>
       </dgm:prSet>
       <dgm:spPr/>
-      <dgm:t>
-        <a:bodyPr/>
-        <a:lstStyle/>
-        <a:p>
-          <a:endParaRPr lang="en-US"/>
-        </a:p>
-      </dgm:t>
     </dgm:pt>
     <dgm:pt modelId="{6D3E33CE-F1D1-475D-99F2-801277404BB5}" type="pres">
       <dgm:prSet presAssocID="{4BB18C1F-F1A8-4750-A60A-0847D9306A31}" presName="sibTrans" presStyleLbl="sibTrans2D1" presStyleIdx="3" presStyleCnt="13"/>
       <dgm:spPr/>
-      <dgm:t>
-        <a:bodyPr/>
-        <a:lstStyle/>
-        <a:p>
-          <a:endParaRPr lang="en-US"/>
-        </a:p>
-      </dgm:t>
     </dgm:pt>
     <dgm:pt modelId="{D3F97101-D05F-4BD2-A86A-0FA4D6B830C7}" type="pres">
       <dgm:prSet presAssocID="{C0D4F740-52CA-4816-B955-D2A9106956D9}" presName="child" presStyleLbl="alignAccFollowNode1" presStyleIdx="3" presStyleCnt="13">
@@ -2002,13 +1932,6 @@
         </dgm:presLayoutVars>
       </dgm:prSet>
       <dgm:spPr/>
-      <dgm:t>
-        <a:bodyPr/>
-        <a:lstStyle/>
-        <a:p>
-          <a:endParaRPr lang="en-US"/>
-        </a:p>
-      </dgm:t>
     </dgm:pt>
     <dgm:pt modelId="{432D78EC-4B0F-4EAE-92DD-F63DE6EC5650}" type="pres">
       <dgm:prSet presAssocID="{97A6EA0E-6BC0-4F82-B5E2-B85E022FD4F6}" presName="hSp" presStyleCnt="0"/>
@@ -2021,24 +1944,10 @@
     <dgm:pt modelId="{AD650BAF-D8BB-42AB-B1FD-23C4485BF783}" type="pres">
       <dgm:prSet presAssocID="{E2BF73DE-6B75-4081-BD30-4F30BC73822B}" presName="header" presStyleLbl="node1" presStyleIdx="2" presStyleCnt="7"/>
       <dgm:spPr/>
-      <dgm:t>
-        <a:bodyPr/>
-        <a:lstStyle/>
-        <a:p>
-          <a:endParaRPr lang="en-US"/>
-        </a:p>
-      </dgm:t>
     </dgm:pt>
     <dgm:pt modelId="{2BD6062E-CB1D-40E2-8DE4-72B83EE173E9}" type="pres">
       <dgm:prSet presAssocID="{450547EA-CA29-4F49-B0AC-0225C6B3F749}" presName="parTrans" presStyleLbl="sibTrans2D1" presStyleIdx="4" presStyleCnt="13"/>
       <dgm:spPr/>
-      <dgm:t>
-        <a:bodyPr/>
-        <a:lstStyle/>
-        <a:p>
-          <a:endParaRPr lang="en-US"/>
-        </a:p>
-      </dgm:t>
     </dgm:pt>
     <dgm:pt modelId="{99F501DA-985E-47FD-945E-121015B89FB8}" type="pres">
       <dgm:prSet presAssocID="{EA384E2B-8A35-4082-AA25-515464A3952C}" presName="child" presStyleLbl="alignAccFollowNode1" presStyleIdx="4" presStyleCnt="13">
@@ -2048,24 +1957,10 @@
         </dgm:presLayoutVars>
       </dgm:prSet>
       <dgm:spPr/>
-      <dgm:t>
-        <a:bodyPr/>
-        <a:lstStyle/>
-        <a:p>
-          <a:endParaRPr lang="en-US"/>
-        </a:p>
-      </dgm:t>
     </dgm:pt>
     <dgm:pt modelId="{761228B1-764B-46A1-85DB-E6A48FA661FB}" type="pres">
       <dgm:prSet presAssocID="{0927F842-C0BD-4BBD-B825-DFD36098D628}" presName="sibTrans" presStyleLbl="sibTrans2D1" presStyleIdx="5" presStyleCnt="13"/>
       <dgm:spPr/>
-      <dgm:t>
-        <a:bodyPr/>
-        <a:lstStyle/>
-        <a:p>
-          <a:endParaRPr lang="en-US"/>
-        </a:p>
-      </dgm:t>
     </dgm:pt>
     <dgm:pt modelId="{398694D2-D6AC-40A9-913B-DD80B34F83B2}" type="pres">
       <dgm:prSet presAssocID="{64D7F16B-EADD-4A0A-AAD9-9F88A3470306}" presName="child" presStyleLbl="alignAccFollowNode1" presStyleIdx="5" presStyleCnt="13">
@@ -2075,13 +1970,6 @@
         </dgm:presLayoutVars>
       </dgm:prSet>
       <dgm:spPr/>
-      <dgm:t>
-        <a:bodyPr/>
-        <a:lstStyle/>
-        <a:p>
-          <a:endParaRPr lang="en-US"/>
-        </a:p>
-      </dgm:t>
     </dgm:pt>
     <dgm:pt modelId="{E40ABCA5-BEB5-455A-B52C-6AD9AF143CE2}" type="pres">
       <dgm:prSet presAssocID="{E2BF73DE-6B75-4081-BD30-4F30BC73822B}" presName="hSp" presStyleCnt="0"/>
@@ -2094,24 +1982,10 @@
     <dgm:pt modelId="{3EFA04F9-B33E-49BA-A76D-D99119FEEF13}" type="pres">
       <dgm:prSet presAssocID="{75152749-8DE7-4077-A13F-EE99E3346BFC}" presName="header" presStyleLbl="node1" presStyleIdx="3" presStyleCnt="7"/>
       <dgm:spPr/>
-      <dgm:t>
-        <a:bodyPr/>
-        <a:lstStyle/>
-        <a:p>
-          <a:endParaRPr lang="en-US"/>
-        </a:p>
-      </dgm:t>
     </dgm:pt>
     <dgm:pt modelId="{B1669015-7547-4AE4-B8F5-0BEE19F7B6CB}" type="pres">
       <dgm:prSet presAssocID="{D6266646-6519-4BF6-8158-FA123C076873}" presName="parTrans" presStyleLbl="sibTrans2D1" presStyleIdx="6" presStyleCnt="13"/>
       <dgm:spPr/>
-      <dgm:t>
-        <a:bodyPr/>
-        <a:lstStyle/>
-        <a:p>
-          <a:endParaRPr lang="en-US"/>
-        </a:p>
-      </dgm:t>
     </dgm:pt>
     <dgm:pt modelId="{CB5142C2-7BA2-4587-86A0-E587F70C91E4}" type="pres">
       <dgm:prSet presAssocID="{1869968E-1001-4B96-B8C5-004CEF7AEF1D}" presName="child" presStyleLbl="alignAccFollowNode1" presStyleIdx="6" presStyleCnt="13">
@@ -2121,24 +1995,10 @@
         </dgm:presLayoutVars>
       </dgm:prSet>
       <dgm:spPr/>
-      <dgm:t>
-        <a:bodyPr/>
-        <a:lstStyle/>
-        <a:p>
-          <a:endParaRPr lang="en-US"/>
-        </a:p>
-      </dgm:t>
     </dgm:pt>
     <dgm:pt modelId="{C1508A80-2148-462F-9552-6F51091921B2}" type="pres">
       <dgm:prSet presAssocID="{DE3326B1-F49E-4FC1-A3AB-094726395324}" presName="sibTrans" presStyleLbl="sibTrans2D1" presStyleIdx="7" presStyleCnt="13"/>
       <dgm:spPr/>
-      <dgm:t>
-        <a:bodyPr/>
-        <a:lstStyle/>
-        <a:p>
-          <a:endParaRPr lang="en-US"/>
-        </a:p>
-      </dgm:t>
     </dgm:pt>
     <dgm:pt modelId="{1C460672-630F-4489-98FD-B14690C461CE}" type="pres">
       <dgm:prSet presAssocID="{1F0B5F77-87D6-48E3-9386-7E31C701455A}" presName="child" presStyleLbl="alignAccFollowNode1" presStyleIdx="7" presStyleCnt="13">
@@ -2148,13 +2008,6 @@
         </dgm:presLayoutVars>
       </dgm:prSet>
       <dgm:spPr/>
-      <dgm:t>
-        <a:bodyPr/>
-        <a:lstStyle/>
-        <a:p>
-          <a:endParaRPr lang="en-US"/>
-        </a:p>
-      </dgm:t>
     </dgm:pt>
     <dgm:pt modelId="{52623409-4FCA-4B1A-B9D9-81A9FED6C151}" type="pres">
       <dgm:prSet presAssocID="{75152749-8DE7-4077-A13F-EE99E3346BFC}" presName="hSp" presStyleCnt="0"/>
@@ -2167,24 +2020,10 @@
     <dgm:pt modelId="{476B5550-B109-47EB-9047-51C231F94702}" type="pres">
       <dgm:prSet presAssocID="{7807414A-3F93-4754-9782-A13D12F7BAD0}" presName="header" presStyleLbl="node1" presStyleIdx="4" presStyleCnt="7"/>
       <dgm:spPr/>
-      <dgm:t>
-        <a:bodyPr/>
-        <a:lstStyle/>
-        <a:p>
-          <a:endParaRPr lang="en-US"/>
-        </a:p>
-      </dgm:t>
     </dgm:pt>
     <dgm:pt modelId="{8ED32C37-DADB-4857-AD48-E757B6B33809}" type="pres">
       <dgm:prSet presAssocID="{D84C9560-9852-4C20-B2B9-FBBBBA5E274E}" presName="parTrans" presStyleLbl="sibTrans2D1" presStyleIdx="8" presStyleCnt="13"/>
       <dgm:spPr/>
-      <dgm:t>
-        <a:bodyPr/>
-        <a:lstStyle/>
-        <a:p>
-          <a:endParaRPr lang="en-US"/>
-        </a:p>
-      </dgm:t>
     </dgm:pt>
     <dgm:pt modelId="{708CD645-5604-4ABA-B7C1-E2BE74461BCE}" type="pres">
       <dgm:prSet presAssocID="{BEBD3605-FEA7-42C4-9631-ECA065165C21}" presName="child" presStyleLbl="alignAccFollowNode1" presStyleIdx="8" presStyleCnt="13">
@@ -2194,24 +2033,10 @@
         </dgm:presLayoutVars>
       </dgm:prSet>
       <dgm:spPr/>
-      <dgm:t>
-        <a:bodyPr/>
-        <a:lstStyle/>
-        <a:p>
-          <a:endParaRPr lang="en-US"/>
-        </a:p>
-      </dgm:t>
     </dgm:pt>
     <dgm:pt modelId="{15BAB19E-C206-4AF3-8948-AECFAA957902}" type="pres">
       <dgm:prSet presAssocID="{10BC5A6D-2195-4D50-8492-3072F1B9A7A5}" presName="sibTrans" presStyleLbl="sibTrans2D1" presStyleIdx="9" presStyleCnt="13"/>
       <dgm:spPr/>
-      <dgm:t>
-        <a:bodyPr/>
-        <a:lstStyle/>
-        <a:p>
-          <a:endParaRPr lang="en-US"/>
-        </a:p>
-      </dgm:t>
     </dgm:pt>
     <dgm:pt modelId="{98CB2700-52DF-4412-A0C0-D6F674B132CA}" type="pres">
       <dgm:prSet presAssocID="{A9EDF174-755E-40C9-AA99-7402218BDC52}" presName="child" presStyleLbl="alignAccFollowNode1" presStyleIdx="9" presStyleCnt="13">
@@ -2221,13 +2046,6 @@
         </dgm:presLayoutVars>
       </dgm:prSet>
       <dgm:spPr/>
-      <dgm:t>
-        <a:bodyPr/>
-        <a:lstStyle/>
-        <a:p>
-          <a:endParaRPr lang="en-US"/>
-        </a:p>
-      </dgm:t>
     </dgm:pt>
     <dgm:pt modelId="{7F86FABD-1AA8-4920-9D22-D69759AD6227}" type="pres">
       <dgm:prSet presAssocID="{7807414A-3F93-4754-9782-A13D12F7BAD0}" presName="hSp" presStyleCnt="0"/>
@@ -2240,24 +2058,10 @@
     <dgm:pt modelId="{80D6EFFD-DA55-4CFD-926A-0D88D52A10E5}" type="pres">
       <dgm:prSet presAssocID="{66C9073C-6EF7-4C58-84E5-347CCE446A80}" presName="header" presStyleLbl="node1" presStyleIdx="5" presStyleCnt="7"/>
       <dgm:spPr/>
-      <dgm:t>
-        <a:bodyPr/>
-        <a:lstStyle/>
-        <a:p>
-          <a:endParaRPr lang="en-US"/>
-        </a:p>
-      </dgm:t>
     </dgm:pt>
     <dgm:pt modelId="{3F3C3D31-4171-494E-A5FB-193DE0C8D45A}" type="pres">
       <dgm:prSet presAssocID="{5EB2C55E-BD88-4109-9D8A-40F175693E9B}" presName="parTrans" presStyleLbl="sibTrans2D1" presStyleIdx="10" presStyleCnt="13"/>
       <dgm:spPr/>
-      <dgm:t>
-        <a:bodyPr/>
-        <a:lstStyle/>
-        <a:p>
-          <a:endParaRPr lang="en-US"/>
-        </a:p>
-      </dgm:t>
     </dgm:pt>
     <dgm:pt modelId="{3907177D-F7E1-4E63-BD22-776D366C75E2}" type="pres">
       <dgm:prSet presAssocID="{48057A94-B260-4AA9-B934-A501B84A3455}" presName="child" presStyleLbl="alignAccFollowNode1" presStyleIdx="10" presStyleCnt="13">
@@ -2267,24 +2071,10 @@
         </dgm:presLayoutVars>
       </dgm:prSet>
       <dgm:spPr/>
-      <dgm:t>
-        <a:bodyPr/>
-        <a:lstStyle/>
-        <a:p>
-          <a:endParaRPr lang="en-US"/>
-        </a:p>
-      </dgm:t>
     </dgm:pt>
     <dgm:pt modelId="{24AD7C85-DE1F-4C68-BC0D-4FD68DEC94F8}" type="pres">
       <dgm:prSet presAssocID="{BEEAE6F2-4047-421A-8315-9D1712266628}" presName="sibTrans" presStyleLbl="sibTrans2D1" presStyleIdx="11" presStyleCnt="13"/>
       <dgm:spPr/>
-      <dgm:t>
-        <a:bodyPr/>
-        <a:lstStyle/>
-        <a:p>
-          <a:endParaRPr lang="en-US"/>
-        </a:p>
-      </dgm:t>
     </dgm:pt>
     <dgm:pt modelId="{690D2CA9-C91B-4F73-9EB5-18037A1653F4}" type="pres">
       <dgm:prSet presAssocID="{99451403-9EB5-48E6-9DDD-3A498C09CD80}" presName="child" presStyleLbl="alignAccFollowNode1" presStyleIdx="11" presStyleCnt="13">
@@ -2294,13 +2084,6 @@
         </dgm:presLayoutVars>
       </dgm:prSet>
       <dgm:spPr/>
-      <dgm:t>
-        <a:bodyPr/>
-        <a:lstStyle/>
-        <a:p>
-          <a:endParaRPr lang="en-US"/>
-        </a:p>
-      </dgm:t>
     </dgm:pt>
     <dgm:pt modelId="{F3F4F508-0B39-4ACC-822B-BAA3FD7BDBDB}" type="pres">
       <dgm:prSet presAssocID="{66C9073C-6EF7-4C58-84E5-347CCE446A80}" presName="hSp" presStyleCnt="0"/>
@@ -2313,24 +2096,10 @@
     <dgm:pt modelId="{89A513FF-70D4-42AE-B373-80E588873AF5}" type="pres">
       <dgm:prSet presAssocID="{0361CCD1-246D-47B4-B405-48494ED9AF7F}" presName="header" presStyleLbl="node1" presStyleIdx="6" presStyleCnt="7"/>
       <dgm:spPr/>
-      <dgm:t>
-        <a:bodyPr/>
-        <a:lstStyle/>
-        <a:p>
-          <a:endParaRPr lang="en-US"/>
-        </a:p>
-      </dgm:t>
     </dgm:pt>
     <dgm:pt modelId="{29FF9187-CE8C-4BC0-8C24-BBA2FACBFA2F}" type="pres">
       <dgm:prSet presAssocID="{FFF0A719-1050-421E-9E99-93BD713323BA}" presName="parTrans" presStyleLbl="sibTrans2D1" presStyleIdx="12" presStyleCnt="13"/>
       <dgm:spPr/>
-      <dgm:t>
-        <a:bodyPr/>
-        <a:lstStyle/>
-        <a:p>
-          <a:endParaRPr lang="en-US"/>
-        </a:p>
-      </dgm:t>
     </dgm:pt>
     <dgm:pt modelId="{75CF4EB9-987D-40B2-B6C4-56331B6ACBDB}" type="pres">
       <dgm:prSet presAssocID="{D21EF9EE-94A8-4307-A611-B1AA1CEF0E08}" presName="child" presStyleLbl="alignAccFollowNode1" presStyleIdx="12" presStyleCnt="13">
@@ -2340,70 +2109,63 @@
         </dgm:presLayoutVars>
       </dgm:prSet>
       <dgm:spPr/>
-      <dgm:t>
-        <a:bodyPr/>
-        <a:lstStyle/>
-        <a:p>
-          <a:endParaRPr lang="en-US"/>
-        </a:p>
-      </dgm:t>
     </dgm:pt>
   </dgm:ptLst>
   <dgm:cxnLst>
+    <dgm:cxn modelId="{57271B00-32F7-4379-9495-86B73C221B6E}" type="presOf" srcId="{341C0893-FB53-4A2A-A2AC-7A22482EF7A7}" destId="{7A468F20-8C75-415E-8DD8-2627F5F8A323}" srcOrd="0" destOrd="0" presId="urn:microsoft.com/office/officeart/2005/8/layout/lProcess1"/>
+    <dgm:cxn modelId="{35D15603-9FBB-485D-8535-A153CD4AE717}" type="presOf" srcId="{A9EDF174-755E-40C9-AA99-7402218BDC52}" destId="{98CB2700-52DF-4412-A0C0-D6F674B132CA}" srcOrd="0" destOrd="0" presId="urn:microsoft.com/office/officeart/2005/8/layout/lProcess1"/>
+    <dgm:cxn modelId="{91050B05-852B-44A4-A6E2-34FCF362CFC5}" srcId="{75152749-8DE7-4077-A13F-EE99E3346BFC}" destId="{1869968E-1001-4B96-B8C5-004CEF7AEF1D}" srcOrd="0" destOrd="0" parTransId="{D6266646-6519-4BF6-8158-FA123C076873}" sibTransId="{DE3326B1-F49E-4FC1-A3AB-094726395324}"/>
+    <dgm:cxn modelId="{C23C9206-755D-4EAA-A108-6990FD517A9E}" type="presOf" srcId="{97A6EA0E-6BC0-4F82-B5E2-B85E022FD4F6}" destId="{BAD4F5A8-74EF-4E3A-B4D3-DF1070CC1EB6}" srcOrd="0" destOrd="0" presId="urn:microsoft.com/office/officeart/2005/8/layout/lProcess1"/>
+    <dgm:cxn modelId="{EC3A6909-DD52-46B0-B736-D96174A4001A}" type="presOf" srcId="{7807414A-3F93-4754-9782-A13D12F7BAD0}" destId="{476B5550-B109-47EB-9047-51C231F94702}" srcOrd="0" destOrd="0" presId="urn:microsoft.com/office/officeart/2005/8/layout/lProcess1"/>
+    <dgm:cxn modelId="{AB26790A-AD68-4C01-9217-74133D8B1105}" type="presOf" srcId="{0361CCD1-246D-47B4-B405-48494ED9AF7F}" destId="{89A513FF-70D4-42AE-B373-80E588873AF5}" srcOrd="0" destOrd="0" presId="urn:microsoft.com/office/officeart/2005/8/layout/lProcess1"/>
+    <dgm:cxn modelId="{7B3B460C-24F3-4AE0-8757-AD44C5475919}" srcId="{E2BF73DE-6B75-4081-BD30-4F30BC73822B}" destId="{EA384E2B-8A35-4082-AA25-515464A3952C}" srcOrd="0" destOrd="0" parTransId="{450547EA-CA29-4F49-B0AC-0225C6B3F749}" sibTransId="{0927F842-C0BD-4BBD-B825-DFD36098D628}"/>
+    <dgm:cxn modelId="{DF02A20C-27FB-47D1-A348-79E688D70440}" srcId="{FE67F327-37A8-421F-80D2-D8BB6A405D3D}" destId="{5BB85F6E-5B49-4E14-AD3B-721F1E9A7B98}" srcOrd="0" destOrd="0" parTransId="{59FBBA1E-6745-4BAD-B0C5-38F0D15DFA94}" sibTransId="{2578AF2E-66D7-4C7E-9142-BB3A84B0166C}"/>
+    <dgm:cxn modelId="{7A86F70D-E097-4C35-A954-7E82AF1091FC}" type="presOf" srcId="{BEBD3605-FEA7-42C4-9631-ECA065165C21}" destId="{708CD645-5604-4ABA-B7C1-E2BE74461BCE}" srcOrd="0" destOrd="0" presId="urn:microsoft.com/office/officeart/2005/8/layout/lProcess1"/>
+    <dgm:cxn modelId="{A9161312-753B-4125-94E2-7A8AF434B2E4}" type="presOf" srcId="{BEEAE6F2-4047-421A-8315-9D1712266628}" destId="{24AD7C85-DE1F-4C68-BC0D-4FD68DEC94F8}" srcOrd="0" destOrd="0" presId="urn:microsoft.com/office/officeart/2005/8/layout/lProcess1"/>
+    <dgm:cxn modelId="{55648819-AFC8-4889-A40F-E7EFDC2AA0FB}" type="presOf" srcId="{FE67F327-37A8-421F-80D2-D8BB6A405D3D}" destId="{6B00C903-05B5-471C-9DF4-DFC1D15792BB}" srcOrd="0" destOrd="0" presId="urn:microsoft.com/office/officeart/2005/8/layout/lProcess1"/>
+    <dgm:cxn modelId="{D0F7F81C-D6E6-4081-AF89-11293CD48BED}" srcId="{7807414A-3F93-4754-9782-A13D12F7BAD0}" destId="{A9EDF174-755E-40C9-AA99-7402218BDC52}" srcOrd="1" destOrd="0" parTransId="{4D4934EC-995B-4649-8E27-B5342DC1A8A5}" sibTransId="{182874F0-7420-483B-8DFF-F30F89C10CF0}"/>
+    <dgm:cxn modelId="{B22A601E-8425-48A6-832D-BA5427BD42A8}" srcId="{E2BF73DE-6B75-4081-BD30-4F30BC73822B}" destId="{64D7F16B-EADD-4A0A-AAD9-9F88A3470306}" srcOrd="1" destOrd="0" parTransId="{32DEA6AA-D0BB-45A9-A0D8-8129D6BC8E46}" sibTransId="{6CDC8032-CCB1-413B-BAB4-8F9CA85AECC1}"/>
+    <dgm:cxn modelId="{1124671E-DC1A-41F5-8B0C-FF333EB8DF2F}" type="presOf" srcId="{7CD28664-2FE9-49B5-91E4-995925399A49}" destId="{4363144C-3FD5-4981-8BA6-0B86FC48CF79}" srcOrd="0" destOrd="0" presId="urn:microsoft.com/office/officeart/2005/8/layout/lProcess1"/>
+    <dgm:cxn modelId="{9F6CA027-D679-4D73-A0BA-187AA0073CDE}" type="presOf" srcId="{0927F842-C0BD-4BBD-B825-DFD36098D628}" destId="{761228B1-764B-46A1-85DB-E6A48FA661FB}" srcOrd="0" destOrd="0" presId="urn:microsoft.com/office/officeart/2005/8/layout/lProcess1"/>
+    <dgm:cxn modelId="{3D3A4632-7B9D-40A4-A793-BC1B27BA39FD}" type="presOf" srcId="{DE3326B1-F49E-4FC1-A3AB-094726395324}" destId="{C1508A80-2148-462F-9552-6F51091921B2}" srcOrd="0" destOrd="0" presId="urn:microsoft.com/office/officeart/2005/8/layout/lProcess1"/>
+    <dgm:cxn modelId="{B5F60639-202D-4F8A-A8B2-8FDB3E42202F}" srcId="{66C9073C-6EF7-4C58-84E5-347CCE446A80}" destId="{48057A94-B260-4AA9-B934-A501B84A3455}" srcOrd="0" destOrd="0" parTransId="{5EB2C55E-BD88-4109-9D8A-40F175693E9B}" sibTransId="{BEEAE6F2-4047-421A-8315-9D1712266628}"/>
+    <dgm:cxn modelId="{C548EA3A-CFA4-4C29-8A94-654F67F2FDD1}" srcId="{341C0893-FB53-4A2A-A2AC-7A22482EF7A7}" destId="{97A6EA0E-6BC0-4F82-B5E2-B85E022FD4F6}" srcOrd="1" destOrd="0" parTransId="{E994DB9C-9DB8-4B40-A156-8243A346B909}" sibTransId="{EDF0F859-D45B-4B7A-A781-B84A90AC7568}"/>
     <dgm:cxn modelId="{DA2FDB3C-11B9-4FDF-AE98-09F08C628925}" type="presOf" srcId="{C0D4F740-52CA-4816-B955-D2A9106956D9}" destId="{D3F97101-D05F-4BD2-A86A-0FA4D6B830C7}" srcOrd="0" destOrd="0" presId="urn:microsoft.com/office/officeart/2005/8/layout/lProcess1"/>
+    <dgm:cxn modelId="{3E20E741-B01F-4336-9D89-289A12AE3086}" type="presOf" srcId="{75152749-8DE7-4077-A13F-EE99E3346BFC}" destId="{3EFA04F9-B33E-49BA-A76D-D99119FEEF13}" srcOrd="0" destOrd="0" presId="urn:microsoft.com/office/officeart/2005/8/layout/lProcess1"/>
+    <dgm:cxn modelId="{4FD1D362-64AA-4258-9D1E-90F2019F98B1}" type="presOf" srcId="{5EB2C55E-BD88-4109-9D8A-40F175693E9B}" destId="{3F3C3D31-4171-494E-A5FB-193DE0C8D45A}" srcOrd="0" destOrd="0" presId="urn:microsoft.com/office/officeart/2005/8/layout/lProcess1"/>
+    <dgm:cxn modelId="{D1395568-AE4E-447E-AE73-202A21D77399}" srcId="{FE67F327-37A8-421F-80D2-D8BB6A405D3D}" destId="{23D2D4DA-7BA3-4319-AD91-6BC5D763616B}" srcOrd="1" destOrd="0" parTransId="{659651B4-EEE9-4F9C-BCD9-1640BB426618}" sibTransId="{E7B2F340-770D-4CA0-8ADF-C81982DDA4DA}"/>
+    <dgm:cxn modelId="{EFAF346A-EBB8-48BE-827F-E7216F0FEB84}" type="presOf" srcId="{2578AF2E-66D7-4C7E-9142-BB3A84B0166C}" destId="{ACD3EA37-C567-4766-BEB0-036D36EA7D76}" srcOrd="0" destOrd="0" presId="urn:microsoft.com/office/officeart/2005/8/layout/lProcess1"/>
+    <dgm:cxn modelId="{6B6C024B-B269-4C91-ACB9-9CA019F000DE}" type="presOf" srcId="{D6266646-6519-4BF6-8158-FA123C076873}" destId="{B1669015-7547-4AE4-B8F5-0BEE19F7B6CB}" srcOrd="0" destOrd="0" presId="urn:microsoft.com/office/officeart/2005/8/layout/lProcess1"/>
+    <dgm:cxn modelId="{01B5574C-32BD-4806-9F23-7DF217ACBB04}" srcId="{341C0893-FB53-4A2A-A2AC-7A22482EF7A7}" destId="{FE67F327-37A8-421F-80D2-D8BB6A405D3D}" srcOrd="0" destOrd="0" parTransId="{4B2BF0ED-3AF9-4D51-9C0A-F855F028F26D}" sibTransId="{7B55E9E7-D862-428F-A154-D9C2EEF2CC23}"/>
+    <dgm:cxn modelId="{3DC3FD6C-3C20-46D3-A737-4F627F960C33}" srcId="{97A6EA0E-6BC0-4F82-B5E2-B85E022FD4F6}" destId="{4F133D7B-C499-4B8F-BE67-32F9E439FB0E}" srcOrd="0" destOrd="0" parTransId="{7CD28664-2FE9-49B5-91E4-995925399A49}" sibTransId="{4BB18C1F-F1A8-4750-A60A-0847D9306A31}"/>
+    <dgm:cxn modelId="{ECD2E24D-12EC-44F7-8050-4562455D77C5}" srcId="{0361CCD1-246D-47B4-B405-48494ED9AF7F}" destId="{D21EF9EE-94A8-4307-A611-B1AA1CEF0E08}" srcOrd="0" destOrd="0" parTransId="{FFF0A719-1050-421E-9E99-93BD713323BA}" sibTransId="{98F5DD16-5CD1-45BA-B25F-8FE305FA4C16}"/>
+    <dgm:cxn modelId="{824F8070-ADD5-4776-802B-27CF8A536579}" srcId="{341C0893-FB53-4A2A-A2AC-7A22482EF7A7}" destId="{75152749-8DE7-4077-A13F-EE99E3346BFC}" srcOrd="3" destOrd="0" parTransId="{BC566DB8-CD45-41E1-B1C7-D999983E278E}" sibTransId="{B3F0244E-35E4-462F-B45E-CB4E49B6CC1A}"/>
+    <dgm:cxn modelId="{784CB850-62C8-405E-A8F8-A208548DA7C4}" srcId="{341C0893-FB53-4A2A-A2AC-7A22482EF7A7}" destId="{0361CCD1-246D-47B4-B405-48494ED9AF7F}" srcOrd="6" destOrd="0" parTransId="{FBEFB2F0-2C25-4621-835E-23C9691C5AA5}" sibTransId="{C6AA01B9-FF1A-426B-B744-E21805A51DD1}"/>
+    <dgm:cxn modelId="{64453B72-C675-443C-8BC9-8DC6494A5874}" type="presOf" srcId="{D21EF9EE-94A8-4307-A611-B1AA1CEF0E08}" destId="{75CF4EB9-987D-40B2-B6C4-56331B6ACBDB}" srcOrd="0" destOrd="0" presId="urn:microsoft.com/office/officeart/2005/8/layout/lProcess1"/>
+    <dgm:cxn modelId="{B5C9EC73-47A7-49BE-95C5-9F2248F12B3F}" type="presOf" srcId="{1869968E-1001-4B96-B8C5-004CEF7AEF1D}" destId="{CB5142C2-7BA2-4587-86A0-E587F70C91E4}" srcOrd="0" destOrd="0" presId="urn:microsoft.com/office/officeart/2005/8/layout/lProcess1"/>
+    <dgm:cxn modelId="{57D60954-3268-450E-8E69-60C1E2DFA20C}" type="presOf" srcId="{1F0B5F77-87D6-48E3-9386-7E31C701455A}" destId="{1C460672-630F-4489-98FD-B14690C461CE}" srcOrd="0" destOrd="0" presId="urn:microsoft.com/office/officeart/2005/8/layout/lProcess1"/>
+    <dgm:cxn modelId="{DA7E3654-F288-43B7-95AC-115215507A03}" srcId="{75152749-8DE7-4077-A13F-EE99E3346BFC}" destId="{1F0B5F77-87D6-48E3-9386-7E31C701455A}" srcOrd="1" destOrd="0" parTransId="{A689873B-7E77-4D35-B425-72032D673C8C}" sibTransId="{B2906581-6A24-488B-B9AB-A91732755056}"/>
+    <dgm:cxn modelId="{EC67F875-F240-4712-A338-E30E74F013E6}" type="presOf" srcId="{5BB85F6E-5B49-4E14-AD3B-721F1E9A7B98}" destId="{31B46375-E2BC-44EB-A251-27286CAB3AE8}" srcOrd="0" destOrd="0" presId="urn:microsoft.com/office/officeart/2005/8/layout/lProcess1"/>
+    <dgm:cxn modelId="{F832605A-5865-4D7B-8AAE-16ECFF428C72}" type="presOf" srcId="{59FBBA1E-6745-4BAD-B0C5-38F0D15DFA94}" destId="{AEDD776F-35F5-4A57-9386-10741FE545F9}" srcOrd="0" destOrd="0" presId="urn:microsoft.com/office/officeart/2005/8/layout/lProcess1"/>
+    <dgm:cxn modelId="{1C2D1C98-92CF-48AE-8374-7BEAAC285148}" type="presOf" srcId="{23D2D4DA-7BA3-4319-AD91-6BC5D763616B}" destId="{297A0CE2-FCEF-4E5D-A892-216C6819EDAB}" srcOrd="0" destOrd="0" presId="urn:microsoft.com/office/officeart/2005/8/layout/lProcess1"/>
+    <dgm:cxn modelId="{EB8D9E99-5C67-476E-A644-392CE76C0A27}" type="presOf" srcId="{450547EA-CA29-4F49-B0AC-0225C6B3F749}" destId="{2BD6062E-CB1D-40E2-8DE4-72B83EE173E9}" srcOrd="0" destOrd="0" presId="urn:microsoft.com/office/officeart/2005/8/layout/lProcess1"/>
+    <dgm:cxn modelId="{BA3D64A3-B112-4977-8061-CF28AE9CE5C3}" type="presOf" srcId="{99451403-9EB5-48E6-9DDD-3A498C09CD80}" destId="{690D2CA9-C91B-4F73-9EB5-18037A1653F4}" srcOrd="0" destOrd="0" presId="urn:microsoft.com/office/officeart/2005/8/layout/lProcess1"/>
+    <dgm:cxn modelId="{14D325A6-1C46-4676-9860-2CA59A03BDA3}" srcId="{341C0893-FB53-4A2A-A2AC-7A22482EF7A7}" destId="{7807414A-3F93-4754-9782-A13D12F7BAD0}" srcOrd="4" destOrd="0" parTransId="{E9FBF7B1-A13C-4105-B71F-61DD6208E4A5}" sibTransId="{A9318916-0602-4E91-A6BF-C201F8FD6C6F}"/>
+    <dgm:cxn modelId="{4DA819B0-79CB-4B4B-8DB1-D786F473EEA9}" srcId="{66C9073C-6EF7-4C58-84E5-347CCE446A80}" destId="{99451403-9EB5-48E6-9DDD-3A498C09CD80}" srcOrd="1" destOrd="0" parTransId="{DE841DF9-0ADA-44D9-ACE3-213C249B3F4A}" sibTransId="{2A5498DB-4EB6-4235-94D1-17B600CEC40E}"/>
+    <dgm:cxn modelId="{286C45B0-19F2-40EF-B5E9-69D86DE853F9}" type="presOf" srcId="{48057A94-B260-4AA9-B934-A501B84A3455}" destId="{3907177D-F7E1-4E63-BD22-776D366C75E2}" srcOrd="0" destOrd="0" presId="urn:microsoft.com/office/officeart/2005/8/layout/lProcess1"/>
+    <dgm:cxn modelId="{0942EDB2-7FD7-407E-BE92-391E8D3D65BD}" type="presOf" srcId="{66C9073C-6EF7-4C58-84E5-347CCE446A80}" destId="{80D6EFFD-DA55-4CFD-926A-0D88D52A10E5}" srcOrd="0" destOrd="0" presId="urn:microsoft.com/office/officeart/2005/8/layout/lProcess1"/>
+    <dgm:cxn modelId="{4E0E82B4-4C85-4528-BC3E-D5985B8A4BC3}" srcId="{341C0893-FB53-4A2A-A2AC-7A22482EF7A7}" destId="{66C9073C-6EF7-4C58-84E5-347CCE446A80}" srcOrd="5" destOrd="0" parTransId="{383F4B3F-BB34-4844-828A-F8A909244C32}" sibTransId="{E481DAC3-B1FE-44C7-B766-8AEDC2D07EAB}"/>
     <dgm:cxn modelId="{A5F084B8-0AC9-4F06-91F6-B634C58E5083}" type="presOf" srcId="{E2BF73DE-6B75-4081-BD30-4F30BC73822B}" destId="{AD650BAF-D8BB-42AB-B1FD-23C4485BF783}" srcOrd="0" destOrd="0" presId="urn:microsoft.com/office/officeart/2005/8/layout/lProcess1"/>
-    <dgm:cxn modelId="{9F6CA027-D679-4D73-A0BA-187AA0073CDE}" type="presOf" srcId="{0927F842-C0BD-4BBD-B825-DFD36098D628}" destId="{761228B1-764B-46A1-85DB-E6A48FA661FB}" srcOrd="0" destOrd="0" presId="urn:microsoft.com/office/officeart/2005/8/layout/lProcess1"/>
+    <dgm:cxn modelId="{36EF95B8-2313-4855-929A-6A22AF293F5B}" type="presOf" srcId="{4F133D7B-C499-4B8F-BE67-32F9E439FB0E}" destId="{F8F0C2EE-8A35-46BE-9E91-A07FA7170E71}" srcOrd="0" destOrd="0" presId="urn:microsoft.com/office/officeart/2005/8/layout/lProcess1"/>
     <dgm:cxn modelId="{4B7014D0-983A-4CEA-AC06-722D0E7C45DC}" type="presOf" srcId="{D84C9560-9852-4C20-B2B9-FBBBBA5E274E}" destId="{8ED32C37-DADB-4857-AD48-E757B6B33809}" srcOrd="0" destOrd="0" presId="urn:microsoft.com/office/officeart/2005/8/layout/lProcess1"/>
-    <dgm:cxn modelId="{57D60954-3268-450E-8E69-60C1E2DFA20C}" type="presOf" srcId="{1F0B5F77-87D6-48E3-9386-7E31C701455A}" destId="{1C460672-630F-4489-98FD-B14690C461CE}" srcOrd="0" destOrd="0" presId="urn:microsoft.com/office/officeart/2005/8/layout/lProcess1"/>
-    <dgm:cxn modelId="{824F8070-ADD5-4776-802B-27CF8A536579}" srcId="{341C0893-FB53-4A2A-A2AC-7A22482EF7A7}" destId="{75152749-8DE7-4077-A13F-EE99E3346BFC}" srcOrd="3" destOrd="0" parTransId="{BC566DB8-CD45-41E1-B1C7-D999983E278E}" sibTransId="{B3F0244E-35E4-462F-B45E-CB4E49B6CC1A}"/>
-    <dgm:cxn modelId="{35D15603-9FBB-485D-8535-A153CD4AE717}" type="presOf" srcId="{A9EDF174-755E-40C9-AA99-7402218BDC52}" destId="{98CB2700-52DF-4412-A0C0-D6F674B132CA}" srcOrd="0" destOrd="0" presId="urn:microsoft.com/office/officeart/2005/8/layout/lProcess1"/>
-    <dgm:cxn modelId="{55648819-AFC8-4889-A40F-E7EFDC2AA0FB}" type="presOf" srcId="{FE67F327-37A8-421F-80D2-D8BB6A405D3D}" destId="{6B00C903-05B5-471C-9DF4-DFC1D15792BB}" srcOrd="0" destOrd="0" presId="urn:microsoft.com/office/officeart/2005/8/layout/lProcess1"/>
-    <dgm:cxn modelId="{3DC3FD6C-3C20-46D3-A737-4F627F960C33}" srcId="{97A6EA0E-6BC0-4F82-B5E2-B85E022FD4F6}" destId="{4F133D7B-C499-4B8F-BE67-32F9E439FB0E}" srcOrd="0" destOrd="0" parTransId="{7CD28664-2FE9-49B5-91E4-995925399A49}" sibTransId="{4BB18C1F-F1A8-4750-A60A-0847D9306A31}"/>
+    <dgm:cxn modelId="{8E2548D3-B498-4D3A-B37E-B81A858F7CB6}" srcId="{341C0893-FB53-4A2A-A2AC-7A22482EF7A7}" destId="{E2BF73DE-6B75-4081-BD30-4F30BC73822B}" srcOrd="2" destOrd="0" parTransId="{00BBC4A2-C648-4EE8-9B85-BD6B1686A090}" sibTransId="{6F717500-2E9F-45CE-A417-A450EB86538A}"/>
+    <dgm:cxn modelId="{0AF0B5D5-0232-4928-90B0-E995FE7547CB}" type="presOf" srcId="{4BB18C1F-F1A8-4750-A60A-0847D9306A31}" destId="{6D3E33CE-F1D1-475D-99F2-801277404BB5}" srcOrd="0" destOrd="0" presId="urn:microsoft.com/office/officeart/2005/8/layout/lProcess1"/>
+    <dgm:cxn modelId="{002A2BDA-6875-43AD-BB46-8B15D7AA853B}" type="presOf" srcId="{10BC5A6D-2195-4D50-8492-3072F1B9A7A5}" destId="{15BAB19E-C206-4AF3-8948-AECFAA957902}" srcOrd="0" destOrd="0" presId="urn:microsoft.com/office/officeart/2005/8/layout/lProcess1"/>
+    <dgm:cxn modelId="{072A52DC-8A9A-45DD-827B-CC8D873946B3}" srcId="{7807414A-3F93-4754-9782-A13D12F7BAD0}" destId="{BEBD3605-FEA7-42C4-9631-ECA065165C21}" srcOrd="0" destOrd="0" parTransId="{D84C9560-9852-4C20-B2B9-FBBBBA5E274E}" sibTransId="{10BC5A6D-2195-4D50-8492-3072F1B9A7A5}"/>
     <dgm:cxn modelId="{59E849E9-298F-4F9D-8730-3FC6A90D149B}" type="presOf" srcId="{64D7F16B-EADD-4A0A-AAD9-9F88A3470306}" destId="{398694D2-D6AC-40A9-913B-DD80B34F83B2}" srcOrd="0" destOrd="0" presId="urn:microsoft.com/office/officeart/2005/8/layout/lProcess1"/>
-    <dgm:cxn modelId="{D0F7F81C-D6E6-4081-AF89-11293CD48BED}" srcId="{7807414A-3F93-4754-9782-A13D12F7BAD0}" destId="{A9EDF174-755E-40C9-AA99-7402218BDC52}" srcOrd="1" destOrd="0" parTransId="{4D4934EC-995B-4649-8E27-B5342DC1A8A5}" sibTransId="{182874F0-7420-483B-8DFF-F30F89C10CF0}"/>
-    <dgm:cxn modelId="{1124671E-DC1A-41F5-8B0C-FF333EB8DF2F}" type="presOf" srcId="{7CD28664-2FE9-49B5-91E4-995925399A49}" destId="{4363144C-3FD5-4981-8BA6-0B86FC48CF79}" srcOrd="0" destOrd="0" presId="urn:microsoft.com/office/officeart/2005/8/layout/lProcess1"/>
-    <dgm:cxn modelId="{3D3A4632-7B9D-40A4-A793-BC1B27BA39FD}" type="presOf" srcId="{DE3326B1-F49E-4FC1-A3AB-094726395324}" destId="{C1508A80-2148-462F-9552-6F51091921B2}" srcOrd="0" destOrd="0" presId="urn:microsoft.com/office/officeart/2005/8/layout/lProcess1"/>
-    <dgm:cxn modelId="{01B5574C-32BD-4806-9F23-7DF217ACBB04}" srcId="{341C0893-FB53-4A2A-A2AC-7A22482EF7A7}" destId="{FE67F327-37A8-421F-80D2-D8BB6A405D3D}" srcOrd="0" destOrd="0" parTransId="{4B2BF0ED-3AF9-4D51-9C0A-F855F028F26D}" sibTransId="{7B55E9E7-D862-428F-A154-D9C2EEF2CC23}"/>
-    <dgm:cxn modelId="{784CB850-62C8-405E-A8F8-A208548DA7C4}" srcId="{341C0893-FB53-4A2A-A2AC-7A22482EF7A7}" destId="{0361CCD1-246D-47B4-B405-48494ED9AF7F}" srcOrd="6" destOrd="0" parTransId="{FBEFB2F0-2C25-4621-835E-23C9691C5AA5}" sibTransId="{C6AA01B9-FF1A-426B-B744-E21805A51DD1}"/>
-    <dgm:cxn modelId="{C23C9206-755D-4EAA-A108-6990FD517A9E}" type="presOf" srcId="{97A6EA0E-6BC0-4F82-B5E2-B85E022FD4F6}" destId="{BAD4F5A8-74EF-4E3A-B4D3-DF1070CC1EB6}" srcOrd="0" destOrd="0" presId="urn:microsoft.com/office/officeart/2005/8/layout/lProcess1"/>
-    <dgm:cxn modelId="{57271B00-32F7-4379-9495-86B73C221B6E}" type="presOf" srcId="{341C0893-FB53-4A2A-A2AC-7A22482EF7A7}" destId="{7A468F20-8C75-415E-8DD8-2627F5F8A323}" srcOrd="0" destOrd="0" presId="urn:microsoft.com/office/officeart/2005/8/layout/lProcess1"/>
-    <dgm:cxn modelId="{002A2BDA-6875-43AD-BB46-8B15D7AA853B}" type="presOf" srcId="{10BC5A6D-2195-4D50-8492-3072F1B9A7A5}" destId="{15BAB19E-C206-4AF3-8948-AECFAA957902}" srcOrd="0" destOrd="0" presId="urn:microsoft.com/office/officeart/2005/8/layout/lProcess1"/>
-    <dgm:cxn modelId="{3E20E741-B01F-4336-9D89-289A12AE3086}" type="presOf" srcId="{75152749-8DE7-4077-A13F-EE99E3346BFC}" destId="{3EFA04F9-B33E-49BA-A76D-D99119FEEF13}" srcOrd="0" destOrd="0" presId="urn:microsoft.com/office/officeart/2005/8/layout/lProcess1"/>
-    <dgm:cxn modelId="{7A86F70D-E097-4C35-A954-7E82AF1091FC}" type="presOf" srcId="{BEBD3605-FEA7-42C4-9631-ECA065165C21}" destId="{708CD645-5604-4ABA-B7C1-E2BE74461BCE}" srcOrd="0" destOrd="0" presId="urn:microsoft.com/office/officeart/2005/8/layout/lProcess1"/>
-    <dgm:cxn modelId="{DF02A20C-27FB-47D1-A348-79E688D70440}" srcId="{FE67F327-37A8-421F-80D2-D8BB6A405D3D}" destId="{5BB85F6E-5B49-4E14-AD3B-721F1E9A7B98}" srcOrd="0" destOrd="0" parTransId="{59FBBA1E-6745-4BAD-B0C5-38F0D15DFA94}" sibTransId="{2578AF2E-66D7-4C7E-9142-BB3A84B0166C}"/>
+    <dgm:cxn modelId="{15A3D3EC-937A-47AE-ADC8-3955979585F7}" type="presOf" srcId="{FFF0A719-1050-421E-9E99-93BD713323BA}" destId="{29FF9187-CE8C-4BC0-8C24-BBA2FACBFA2F}" srcOrd="0" destOrd="0" presId="urn:microsoft.com/office/officeart/2005/8/layout/lProcess1"/>
+    <dgm:cxn modelId="{94DB80F6-4DA1-4906-832A-2CF48881B2C2}" srcId="{97A6EA0E-6BC0-4F82-B5E2-B85E022FD4F6}" destId="{C0D4F740-52CA-4816-B955-D2A9106956D9}" srcOrd="1" destOrd="0" parTransId="{22AA9A45-6266-44FE-969F-2ECD11801A7C}" sibTransId="{A5C80507-C722-4935-B646-850187C5F163}"/>
     <dgm:cxn modelId="{3E1F7EFC-D483-46C6-A1F6-01C9F9657833}" type="presOf" srcId="{EA384E2B-8A35-4082-AA25-515464A3952C}" destId="{99F501DA-985E-47FD-945E-121015B89FB8}" srcOrd="0" destOrd="0" presId="urn:microsoft.com/office/officeart/2005/8/layout/lProcess1"/>
-    <dgm:cxn modelId="{AB26790A-AD68-4C01-9217-74133D8B1105}" type="presOf" srcId="{0361CCD1-246D-47B4-B405-48494ED9AF7F}" destId="{89A513FF-70D4-42AE-B373-80E588873AF5}" srcOrd="0" destOrd="0" presId="urn:microsoft.com/office/officeart/2005/8/layout/lProcess1"/>
-    <dgm:cxn modelId="{C548EA3A-CFA4-4C29-8A94-654F67F2FDD1}" srcId="{341C0893-FB53-4A2A-A2AC-7A22482EF7A7}" destId="{97A6EA0E-6BC0-4F82-B5E2-B85E022FD4F6}" srcOrd="1" destOrd="0" parTransId="{E994DB9C-9DB8-4B40-A156-8243A346B909}" sibTransId="{EDF0F859-D45B-4B7A-A781-B84A90AC7568}"/>
-    <dgm:cxn modelId="{91050B05-852B-44A4-A6E2-34FCF362CFC5}" srcId="{75152749-8DE7-4077-A13F-EE99E3346BFC}" destId="{1869968E-1001-4B96-B8C5-004CEF7AEF1D}" srcOrd="0" destOrd="0" parTransId="{D6266646-6519-4BF6-8158-FA123C076873}" sibTransId="{DE3326B1-F49E-4FC1-A3AB-094726395324}"/>
-    <dgm:cxn modelId="{0942EDB2-7FD7-407E-BE92-391E8D3D65BD}" type="presOf" srcId="{66C9073C-6EF7-4C58-84E5-347CCE446A80}" destId="{80D6EFFD-DA55-4CFD-926A-0D88D52A10E5}" srcOrd="0" destOrd="0" presId="urn:microsoft.com/office/officeart/2005/8/layout/lProcess1"/>
-    <dgm:cxn modelId="{072A52DC-8A9A-45DD-827B-CC8D873946B3}" srcId="{7807414A-3F93-4754-9782-A13D12F7BAD0}" destId="{BEBD3605-FEA7-42C4-9631-ECA065165C21}" srcOrd="0" destOrd="0" parTransId="{D84C9560-9852-4C20-B2B9-FBBBBA5E274E}" sibTransId="{10BC5A6D-2195-4D50-8492-3072F1B9A7A5}"/>
-    <dgm:cxn modelId="{EC3A6909-DD52-46B0-B736-D96174A4001A}" type="presOf" srcId="{7807414A-3F93-4754-9782-A13D12F7BAD0}" destId="{476B5550-B109-47EB-9047-51C231F94702}" srcOrd="0" destOrd="0" presId="urn:microsoft.com/office/officeart/2005/8/layout/lProcess1"/>
-    <dgm:cxn modelId="{ECD2E24D-12EC-44F7-8050-4562455D77C5}" srcId="{0361CCD1-246D-47B4-B405-48494ED9AF7F}" destId="{D21EF9EE-94A8-4307-A611-B1AA1CEF0E08}" srcOrd="0" destOrd="0" parTransId="{FFF0A719-1050-421E-9E99-93BD713323BA}" sibTransId="{98F5DD16-5CD1-45BA-B25F-8FE305FA4C16}"/>
-    <dgm:cxn modelId="{EC67F875-F240-4712-A338-E30E74F013E6}" type="presOf" srcId="{5BB85F6E-5B49-4E14-AD3B-721F1E9A7B98}" destId="{31B46375-E2BC-44EB-A251-27286CAB3AE8}" srcOrd="0" destOrd="0" presId="urn:microsoft.com/office/officeart/2005/8/layout/lProcess1"/>
-    <dgm:cxn modelId="{36EF95B8-2313-4855-929A-6A22AF293F5B}" type="presOf" srcId="{4F133D7B-C499-4B8F-BE67-32F9E439FB0E}" destId="{F8F0C2EE-8A35-46BE-9E91-A07FA7170E71}" srcOrd="0" destOrd="0" presId="urn:microsoft.com/office/officeart/2005/8/layout/lProcess1"/>
-    <dgm:cxn modelId="{B22A601E-8425-48A6-832D-BA5427BD42A8}" srcId="{E2BF73DE-6B75-4081-BD30-4F30BC73822B}" destId="{64D7F16B-EADD-4A0A-AAD9-9F88A3470306}" srcOrd="1" destOrd="0" parTransId="{32DEA6AA-D0BB-45A9-A0D8-8129D6BC8E46}" sibTransId="{6CDC8032-CCB1-413B-BAB4-8F9CA85AECC1}"/>
-    <dgm:cxn modelId="{4E0E82B4-4C85-4528-BC3E-D5985B8A4BC3}" srcId="{341C0893-FB53-4A2A-A2AC-7A22482EF7A7}" destId="{66C9073C-6EF7-4C58-84E5-347CCE446A80}" srcOrd="5" destOrd="0" parTransId="{383F4B3F-BB34-4844-828A-F8A909244C32}" sibTransId="{E481DAC3-B1FE-44C7-B766-8AEDC2D07EAB}"/>
-    <dgm:cxn modelId="{8E2548D3-B498-4D3A-B37E-B81A858F7CB6}" srcId="{341C0893-FB53-4A2A-A2AC-7A22482EF7A7}" destId="{E2BF73DE-6B75-4081-BD30-4F30BC73822B}" srcOrd="2" destOrd="0" parTransId="{00BBC4A2-C648-4EE8-9B85-BD6B1686A090}" sibTransId="{6F717500-2E9F-45CE-A417-A450EB86538A}"/>
-    <dgm:cxn modelId="{EB8D9E99-5C67-476E-A644-392CE76C0A27}" type="presOf" srcId="{450547EA-CA29-4F49-B0AC-0225C6B3F749}" destId="{2BD6062E-CB1D-40E2-8DE4-72B83EE173E9}" srcOrd="0" destOrd="0" presId="urn:microsoft.com/office/officeart/2005/8/layout/lProcess1"/>
-    <dgm:cxn modelId="{286C45B0-19F2-40EF-B5E9-69D86DE853F9}" type="presOf" srcId="{48057A94-B260-4AA9-B934-A501B84A3455}" destId="{3907177D-F7E1-4E63-BD22-776D366C75E2}" srcOrd="0" destOrd="0" presId="urn:microsoft.com/office/officeart/2005/8/layout/lProcess1"/>
-    <dgm:cxn modelId="{EFAF346A-EBB8-48BE-827F-E7216F0FEB84}" type="presOf" srcId="{2578AF2E-66D7-4C7E-9142-BB3A84B0166C}" destId="{ACD3EA37-C567-4766-BEB0-036D36EA7D76}" srcOrd="0" destOrd="0" presId="urn:microsoft.com/office/officeart/2005/8/layout/lProcess1"/>
-    <dgm:cxn modelId="{4DA819B0-79CB-4B4B-8DB1-D786F473EEA9}" srcId="{66C9073C-6EF7-4C58-84E5-347CCE446A80}" destId="{99451403-9EB5-48E6-9DDD-3A498C09CD80}" srcOrd="1" destOrd="0" parTransId="{DE841DF9-0ADA-44D9-ACE3-213C249B3F4A}" sibTransId="{2A5498DB-4EB6-4235-94D1-17B600CEC40E}"/>
-    <dgm:cxn modelId="{0AF0B5D5-0232-4928-90B0-E995FE7547CB}" type="presOf" srcId="{4BB18C1F-F1A8-4750-A60A-0847D9306A31}" destId="{6D3E33CE-F1D1-475D-99F2-801277404BB5}" srcOrd="0" destOrd="0" presId="urn:microsoft.com/office/officeart/2005/8/layout/lProcess1"/>
-    <dgm:cxn modelId="{4FD1D362-64AA-4258-9D1E-90F2019F98B1}" type="presOf" srcId="{5EB2C55E-BD88-4109-9D8A-40F175693E9B}" destId="{3F3C3D31-4171-494E-A5FB-193DE0C8D45A}" srcOrd="0" destOrd="0" presId="urn:microsoft.com/office/officeart/2005/8/layout/lProcess1"/>
-    <dgm:cxn modelId="{1C2D1C98-92CF-48AE-8374-7BEAAC285148}" type="presOf" srcId="{23D2D4DA-7BA3-4319-AD91-6BC5D763616B}" destId="{297A0CE2-FCEF-4E5D-A892-216C6819EDAB}" srcOrd="0" destOrd="0" presId="urn:microsoft.com/office/officeart/2005/8/layout/lProcess1"/>
-    <dgm:cxn modelId="{F832605A-5865-4D7B-8AAE-16ECFF428C72}" type="presOf" srcId="{59FBBA1E-6745-4BAD-B0C5-38F0D15DFA94}" destId="{AEDD776F-35F5-4A57-9386-10741FE545F9}" srcOrd="0" destOrd="0" presId="urn:microsoft.com/office/officeart/2005/8/layout/lProcess1"/>
-    <dgm:cxn modelId="{A9161312-753B-4125-94E2-7A8AF434B2E4}" type="presOf" srcId="{BEEAE6F2-4047-421A-8315-9D1712266628}" destId="{24AD7C85-DE1F-4C68-BC0D-4FD68DEC94F8}" srcOrd="0" destOrd="0" presId="urn:microsoft.com/office/officeart/2005/8/layout/lProcess1"/>
-    <dgm:cxn modelId="{B5C9EC73-47A7-49BE-95C5-9F2248F12B3F}" type="presOf" srcId="{1869968E-1001-4B96-B8C5-004CEF7AEF1D}" destId="{CB5142C2-7BA2-4587-86A0-E587F70C91E4}" srcOrd="0" destOrd="0" presId="urn:microsoft.com/office/officeart/2005/8/layout/lProcess1"/>
-    <dgm:cxn modelId="{94DB80F6-4DA1-4906-832A-2CF48881B2C2}" srcId="{97A6EA0E-6BC0-4F82-B5E2-B85E022FD4F6}" destId="{C0D4F740-52CA-4816-B955-D2A9106956D9}" srcOrd="1" destOrd="0" parTransId="{22AA9A45-6266-44FE-969F-2ECD11801A7C}" sibTransId="{A5C80507-C722-4935-B646-850187C5F163}"/>
-    <dgm:cxn modelId="{14D325A6-1C46-4676-9860-2CA59A03BDA3}" srcId="{341C0893-FB53-4A2A-A2AC-7A22482EF7A7}" destId="{7807414A-3F93-4754-9782-A13D12F7BAD0}" srcOrd="4" destOrd="0" parTransId="{E9FBF7B1-A13C-4105-B71F-61DD6208E4A5}" sibTransId="{A9318916-0602-4E91-A6BF-C201F8FD6C6F}"/>
-    <dgm:cxn modelId="{7B3B460C-24F3-4AE0-8757-AD44C5475919}" srcId="{E2BF73DE-6B75-4081-BD30-4F30BC73822B}" destId="{EA384E2B-8A35-4082-AA25-515464A3952C}" srcOrd="0" destOrd="0" parTransId="{450547EA-CA29-4F49-B0AC-0225C6B3F749}" sibTransId="{0927F842-C0BD-4BBD-B825-DFD36098D628}"/>
-    <dgm:cxn modelId="{DA7E3654-F288-43B7-95AC-115215507A03}" srcId="{75152749-8DE7-4077-A13F-EE99E3346BFC}" destId="{1F0B5F77-87D6-48E3-9386-7E31C701455A}" srcOrd="1" destOrd="0" parTransId="{A689873B-7E77-4D35-B425-72032D673C8C}" sibTransId="{B2906581-6A24-488B-B9AB-A91732755056}"/>
-    <dgm:cxn modelId="{B5F60639-202D-4F8A-A8B2-8FDB3E42202F}" srcId="{66C9073C-6EF7-4C58-84E5-347CCE446A80}" destId="{48057A94-B260-4AA9-B934-A501B84A3455}" srcOrd="0" destOrd="0" parTransId="{5EB2C55E-BD88-4109-9D8A-40F175693E9B}" sibTransId="{BEEAE6F2-4047-421A-8315-9D1712266628}"/>
-    <dgm:cxn modelId="{15A3D3EC-937A-47AE-ADC8-3955979585F7}" type="presOf" srcId="{FFF0A719-1050-421E-9E99-93BD713323BA}" destId="{29FF9187-CE8C-4BC0-8C24-BBA2FACBFA2F}" srcOrd="0" destOrd="0" presId="urn:microsoft.com/office/officeart/2005/8/layout/lProcess1"/>
-    <dgm:cxn modelId="{64453B72-C675-443C-8BC9-8DC6494A5874}" type="presOf" srcId="{D21EF9EE-94A8-4307-A611-B1AA1CEF0E08}" destId="{75CF4EB9-987D-40B2-B6C4-56331B6ACBDB}" srcOrd="0" destOrd="0" presId="urn:microsoft.com/office/officeart/2005/8/layout/lProcess1"/>
-    <dgm:cxn modelId="{BA3D64A3-B112-4977-8061-CF28AE9CE5C3}" type="presOf" srcId="{99451403-9EB5-48E6-9DDD-3A498C09CD80}" destId="{690D2CA9-C91B-4F73-9EB5-18037A1653F4}" srcOrd="0" destOrd="0" presId="urn:microsoft.com/office/officeart/2005/8/layout/lProcess1"/>
-    <dgm:cxn modelId="{6B6C024B-B269-4C91-ACB9-9CA019F000DE}" type="presOf" srcId="{D6266646-6519-4BF6-8158-FA123C076873}" destId="{B1669015-7547-4AE4-B8F5-0BEE19F7B6CB}" srcOrd="0" destOrd="0" presId="urn:microsoft.com/office/officeart/2005/8/layout/lProcess1"/>
-    <dgm:cxn modelId="{D1395568-AE4E-447E-AE73-202A21D77399}" srcId="{FE67F327-37A8-421F-80D2-D8BB6A405D3D}" destId="{23D2D4DA-7BA3-4319-AD91-6BC5D763616B}" srcOrd="1" destOrd="0" parTransId="{659651B4-EEE9-4F9C-BCD9-1640BB426618}" sibTransId="{E7B2F340-770D-4CA0-8ADF-C81982DDA4DA}"/>
     <dgm:cxn modelId="{2539B7F7-11D7-417C-96CE-C581666A65A3}" type="presParOf" srcId="{7A468F20-8C75-415E-8DD8-2627F5F8A323}" destId="{B7B4435E-04B3-45F7-B751-472B7DA342B1}" srcOrd="0" destOrd="0" presId="urn:microsoft.com/office/officeart/2005/8/layout/lProcess1"/>
     <dgm:cxn modelId="{D899E801-0FE0-4F68-B9A1-BE947E55D173}" type="presParOf" srcId="{B7B4435E-04B3-45F7-B751-472B7DA342B1}" destId="{6B00C903-05B5-471C-9DF4-DFC1D15792BB}" srcOrd="0" destOrd="0" presId="urn:microsoft.com/office/officeart/2005/8/layout/lProcess1"/>
     <dgm:cxn modelId="{6C27D8BB-617E-4AFE-B9E2-75F11172BA32}" type="presParOf" srcId="{B7B4435E-04B3-45F7-B751-472B7DA342B1}" destId="{AEDD776F-35F5-4A57-9386-10741FE545F9}" srcOrd="1" destOrd="0" presId="urn:microsoft.com/office/officeart/2005/8/layout/lProcess1"/>
@@ -2525,7 +2287,7 @@
         </a:bodyPr>
         <a:lstStyle/>
         <a:p>
-          <a:pPr lvl="0" algn="ctr" defTabSz="622300">
+          <a:pPr marL="0" lvl="0" indent="0" algn="ctr" defTabSz="622300">
             <a:lnSpc>
               <a:spcPct val="90000"/>
             </a:lnSpc>
@@ -2535,6 +2297,7 @@
             <a:spcAft>
               <a:spcPct val="35000"/>
             </a:spcAft>
+            <a:buNone/>
           </a:pPr>
           <a:r>
             <a:rPr lang="en-US" sz="1400" kern="1200" dirty="0"/>
@@ -2650,7 +2413,7 @@
         </a:bodyPr>
         <a:lstStyle/>
         <a:p>
-          <a:pPr lvl="0" algn="ctr" defTabSz="355600">
+          <a:pPr marL="0" lvl="0" indent="0" algn="ctr" defTabSz="355600">
             <a:lnSpc>
               <a:spcPct val="90000"/>
             </a:lnSpc>
@@ -2660,6 +2423,7 @@
             <a:spcAft>
               <a:spcPct val="35000"/>
             </a:spcAft>
+            <a:buNone/>
           </a:pPr>
           <a:r>
             <a:rPr lang="en-US" sz="800" kern="1200" dirty="0"/>
@@ -2775,7 +2539,7 @@
         </a:bodyPr>
         <a:lstStyle/>
         <a:p>
-          <a:pPr lvl="0" algn="ctr" defTabSz="355600">
+          <a:pPr marL="0" lvl="0" indent="0" algn="ctr" defTabSz="355600">
             <a:lnSpc>
               <a:spcPct val="90000"/>
             </a:lnSpc>
@@ -2785,6 +2549,7 @@
             <a:spcAft>
               <a:spcPct val="35000"/>
             </a:spcAft>
+            <a:buNone/>
           </a:pPr>
           <a:r>
             <a:rPr lang="en-US" sz="800" kern="1200" dirty="0"/>
@@ -2853,7 +2618,7 @@
         </a:bodyPr>
         <a:lstStyle/>
         <a:p>
-          <a:pPr lvl="0" algn="ctr" defTabSz="622300">
+          <a:pPr marL="0" lvl="0" indent="0" algn="ctr" defTabSz="622300">
             <a:lnSpc>
               <a:spcPct val="90000"/>
             </a:lnSpc>
@@ -2863,6 +2628,7 @@
             <a:spcAft>
               <a:spcPct val="35000"/>
             </a:spcAft>
+            <a:buNone/>
           </a:pPr>
           <a:r>
             <a:rPr lang="en-US" sz="1400" kern="1200" dirty="0"/>
@@ -2978,7 +2744,7 @@
         </a:bodyPr>
         <a:lstStyle/>
         <a:p>
-          <a:pPr lvl="0" algn="ctr" defTabSz="355600">
+          <a:pPr marL="0" lvl="0" indent="0" algn="ctr" defTabSz="355600">
             <a:lnSpc>
               <a:spcPct val="90000"/>
             </a:lnSpc>
@@ -2988,6 +2754,7 @@
             <a:spcAft>
               <a:spcPct val="35000"/>
             </a:spcAft>
+            <a:buNone/>
           </a:pPr>
           <a:r>
             <a:rPr lang="en-US" sz="800" kern="1200" dirty="0"/>
@@ -3103,7 +2870,7 @@
         </a:bodyPr>
         <a:lstStyle/>
         <a:p>
-          <a:pPr lvl="0" algn="ctr" defTabSz="355600">
+          <a:pPr marL="0" lvl="0" indent="0" algn="ctr" defTabSz="355600">
             <a:lnSpc>
               <a:spcPct val="90000"/>
             </a:lnSpc>
@@ -3113,6 +2880,7 @@
             <a:spcAft>
               <a:spcPct val="35000"/>
             </a:spcAft>
+            <a:buNone/>
           </a:pPr>
           <a:r>
             <a:rPr lang="en-US" sz="800" kern="1200" dirty="0"/>
@@ -3181,7 +2949,7 @@
         </a:bodyPr>
         <a:lstStyle/>
         <a:p>
-          <a:pPr lvl="0" algn="ctr" defTabSz="622300">
+          <a:pPr marL="0" lvl="0" indent="0" algn="ctr" defTabSz="622300">
             <a:lnSpc>
               <a:spcPct val="90000"/>
             </a:lnSpc>
@@ -3191,6 +2959,7 @@
             <a:spcAft>
               <a:spcPct val="35000"/>
             </a:spcAft>
+            <a:buNone/>
           </a:pPr>
           <a:r>
             <a:rPr lang="en-US" sz="1400" kern="1200" dirty="0"/>
@@ -3306,7 +3075,7 @@
         </a:bodyPr>
         <a:lstStyle/>
         <a:p>
-          <a:pPr lvl="0" algn="ctr" defTabSz="355600">
+          <a:pPr marL="0" lvl="0" indent="0" algn="ctr" defTabSz="355600">
             <a:lnSpc>
               <a:spcPct val="90000"/>
             </a:lnSpc>
@@ -3316,6 +3085,7 @@
             <a:spcAft>
               <a:spcPct val="35000"/>
             </a:spcAft>
+            <a:buNone/>
           </a:pPr>
           <a:r>
             <a:rPr lang="en-US" sz="800" kern="1200" dirty="0"/>
@@ -3431,7 +3201,7 @@
         </a:bodyPr>
         <a:lstStyle/>
         <a:p>
-          <a:pPr lvl="0" algn="ctr" defTabSz="355600">
+          <a:pPr marL="0" lvl="0" indent="0" algn="ctr" defTabSz="355600">
             <a:lnSpc>
               <a:spcPct val="90000"/>
             </a:lnSpc>
@@ -3441,6 +3211,7 @@
             <a:spcAft>
               <a:spcPct val="35000"/>
             </a:spcAft>
+            <a:buNone/>
           </a:pPr>
           <a:r>
             <a:rPr lang="en-US" sz="800" kern="1200"/>
@@ -3510,7 +3281,7 @@
         </a:bodyPr>
         <a:lstStyle/>
         <a:p>
-          <a:pPr lvl="0" algn="ctr" defTabSz="622300">
+          <a:pPr marL="0" lvl="0" indent="0" algn="ctr" defTabSz="622300">
             <a:lnSpc>
               <a:spcPct val="90000"/>
             </a:lnSpc>
@@ -3520,6 +3291,7 @@
             <a:spcAft>
               <a:spcPct val="35000"/>
             </a:spcAft>
+            <a:buNone/>
           </a:pPr>
           <a:r>
             <a:rPr lang="en-US" sz="1400" kern="1200" dirty="0"/>
@@ -3635,7 +3407,7 @@
         </a:bodyPr>
         <a:lstStyle/>
         <a:p>
-          <a:pPr lvl="0" algn="ctr" defTabSz="355600">
+          <a:pPr marL="0" lvl="0" indent="0" algn="ctr" defTabSz="355600">
             <a:lnSpc>
               <a:spcPct val="90000"/>
             </a:lnSpc>
@@ -3645,6 +3417,7 @@
             <a:spcAft>
               <a:spcPct val="35000"/>
             </a:spcAft>
+            <a:buNone/>
           </a:pPr>
           <a:r>
             <a:rPr lang="en-US" sz="800" kern="1200" dirty="0"/>
@@ -3760,7 +3533,7 @@
         </a:bodyPr>
         <a:lstStyle/>
         <a:p>
-          <a:pPr lvl="0" algn="ctr" defTabSz="355600">
+          <a:pPr marL="0" lvl="0" indent="0" algn="ctr" defTabSz="355600">
             <a:lnSpc>
               <a:spcPct val="90000"/>
             </a:lnSpc>
@@ -3770,6 +3543,7 @@
             <a:spcAft>
               <a:spcPct val="35000"/>
             </a:spcAft>
+            <a:buNone/>
           </a:pPr>
           <a:r>
             <a:rPr lang="en-US" sz="800" kern="1200" dirty="0"/>
@@ -3838,7 +3612,7 @@
         </a:bodyPr>
         <a:lstStyle/>
         <a:p>
-          <a:pPr lvl="0" algn="ctr" defTabSz="622300">
+          <a:pPr marL="0" lvl="0" indent="0" algn="ctr" defTabSz="622300">
             <a:lnSpc>
               <a:spcPct val="90000"/>
             </a:lnSpc>
@@ -3848,6 +3622,7 @@
             <a:spcAft>
               <a:spcPct val="35000"/>
             </a:spcAft>
+            <a:buNone/>
           </a:pPr>
           <a:r>
             <a:rPr lang="en-US" sz="1400" kern="1200" dirty="0"/>
@@ -3963,7 +3738,7 @@
         </a:bodyPr>
         <a:lstStyle/>
         <a:p>
-          <a:pPr lvl="0" algn="ctr" defTabSz="355600">
+          <a:pPr marL="0" lvl="0" indent="0" algn="ctr" defTabSz="355600">
             <a:lnSpc>
               <a:spcPct val="90000"/>
             </a:lnSpc>
@@ -3973,6 +3748,7 @@
             <a:spcAft>
               <a:spcPct val="35000"/>
             </a:spcAft>
+            <a:buNone/>
           </a:pPr>
           <a:r>
             <a:rPr lang="en-US" sz="800" kern="1200" dirty="0"/>
@@ -4088,7 +3864,7 @@
         </a:bodyPr>
         <a:lstStyle/>
         <a:p>
-          <a:pPr lvl="0" algn="ctr" defTabSz="355600">
+          <a:pPr marL="0" lvl="0" indent="0" algn="ctr" defTabSz="355600">
             <a:lnSpc>
               <a:spcPct val="90000"/>
             </a:lnSpc>
@@ -4098,6 +3874,7 @@
             <a:spcAft>
               <a:spcPct val="35000"/>
             </a:spcAft>
+            <a:buNone/>
           </a:pPr>
           <a:r>
             <a:rPr lang="en-US" sz="800" kern="1200" dirty="0"/>
@@ -4166,7 +3943,7 @@
         </a:bodyPr>
         <a:lstStyle/>
         <a:p>
-          <a:pPr lvl="0" algn="ctr" defTabSz="622300">
+          <a:pPr marL="0" lvl="0" indent="0" algn="ctr" defTabSz="622300">
             <a:lnSpc>
               <a:spcPct val="90000"/>
             </a:lnSpc>
@@ -4176,6 +3953,7 @@
             <a:spcAft>
               <a:spcPct val="35000"/>
             </a:spcAft>
+            <a:buNone/>
           </a:pPr>
           <a:r>
             <a:rPr lang="en-US" sz="1400" kern="1200" dirty="0"/>
@@ -4291,7 +4069,7 @@
         </a:bodyPr>
         <a:lstStyle/>
         <a:p>
-          <a:pPr lvl="0" algn="ctr" defTabSz="355600">
+          <a:pPr marL="0" lvl="0" indent="0" algn="ctr" defTabSz="355600">
             <a:lnSpc>
               <a:spcPct val="90000"/>
             </a:lnSpc>
@@ -4301,6 +4079,7 @@
             <a:spcAft>
               <a:spcPct val="35000"/>
             </a:spcAft>
+            <a:buNone/>
           </a:pPr>
           <a:r>
             <a:rPr lang="en-US" sz="800" kern="1200" dirty="0"/>
@@ -4416,7 +4195,7 @@
         </a:bodyPr>
         <a:lstStyle/>
         <a:p>
-          <a:pPr lvl="0" algn="ctr" defTabSz="355600">
+          <a:pPr marL="0" lvl="0" indent="0" algn="ctr" defTabSz="355600">
             <a:lnSpc>
               <a:spcPct val="90000"/>
             </a:lnSpc>
@@ -4426,6 +4205,7 @@
             <a:spcAft>
               <a:spcPct val="35000"/>
             </a:spcAft>
+            <a:buNone/>
           </a:pPr>
           <a:r>
             <a:rPr lang="en-US" sz="800" kern="1200" dirty="0"/>
@@ -4494,7 +4274,7 @@
         </a:bodyPr>
         <a:lstStyle/>
         <a:p>
-          <a:pPr lvl="0" algn="ctr" defTabSz="622300">
+          <a:pPr marL="0" lvl="0" indent="0" algn="ctr" defTabSz="622300">
             <a:lnSpc>
               <a:spcPct val="90000"/>
             </a:lnSpc>
@@ -4504,6 +4284,7 @@
             <a:spcAft>
               <a:spcPct val="35000"/>
             </a:spcAft>
+            <a:buNone/>
           </a:pPr>
           <a:r>
             <a:rPr lang="en-US" sz="1400" kern="1200" dirty="0"/>
@@ -4619,7 +4400,7 @@
         </a:bodyPr>
         <a:lstStyle/>
         <a:p>
-          <a:pPr lvl="0" algn="ctr" defTabSz="355600">
+          <a:pPr marL="0" lvl="0" indent="0" algn="ctr" defTabSz="355600">
             <a:lnSpc>
               <a:spcPct val="90000"/>
             </a:lnSpc>
@@ -4629,6 +4410,7 @@
             <a:spcAft>
               <a:spcPct val="35000"/>
             </a:spcAft>
+            <a:buNone/>
           </a:pPr>
           <a:r>
             <a:rPr lang="en-US" sz="800" kern="1200" dirty="0"/>
@@ -6023,7 +5805,7 @@
           <a:p>
             <a:fld id="{71933532-7A6B-444F-BAAA-95C4DDC0F762}" type="datetimeFigureOut">
               <a:rPr lang="en-CA" smtClean="0"/>
-              <a:t>2017-07-28</a:t>
+              <a:t>2017-09-25</a:t>
             </a:fld>
             <a:endParaRPr lang="en-CA"/>
           </a:p>
@@ -13397,7 +13179,7 @@
           <a:p>
             <a:fld id="{E13F4214-B2F9-482A-B8A4-237B2216D5B8}" type="datetimeFigureOut">
               <a:rPr lang="en-US" smtClean="0"/>
-              <a:t>7/28/17</a:t>
+              <a:t>9/25/2017</a:t>
             </a:fld>
             <a:endParaRPr lang="en-US"/>
           </a:p>
@@ -16598,12 +16380,8 @@
               <a:buNone/>
             </a:pPr>
             <a:r>
-              <a:rPr lang="en-US" dirty="0" smtClean="0"/>
-              <a:t>Handlebars</a:t>
-            </a:r>
-            <a:r>
-              <a:rPr lang="en-US" dirty="0"/>
-              <a:t>, angular, </a:t>
+              <a:rPr lang="en-US" dirty="0"/>
+              <a:t>Handlebars, angular, </a:t>
             </a:r>
             <a:r>
               <a:rPr lang="en-US" dirty="0" err="1"/>
@@ -16618,7 +16396,7 @@
             <a:pPr marL="0" indent="0">
               <a:buNone/>
             </a:pPr>
-            <a:endParaRPr lang="en-US" dirty="0" smtClean="0"/>
+            <a:endParaRPr lang="en-US" dirty="0"/>
           </a:p>
           <a:p>
             <a:pPr marL="0" indent="0">
@@ -17618,6 +17396,20 @@
           <a:p>
             <a:r>
               <a:rPr lang="en-US" dirty="0"/>
+              <a:t>Specify CDN in config/write-</a:t>
+            </a:r>
+            <a:r>
+              <a:rPr lang="en-US" dirty="0" err="1"/>
+              <a:t>manifests.json</a:t>
+            </a:r>
+            <a:endParaRPr lang="en-US" dirty="0"/>
+          </a:p>
+          <a:p>
+            <a:endParaRPr lang="en-US" dirty="0"/>
+          </a:p>
+          <a:p>
+            <a:r>
+              <a:rPr lang="en-US" dirty="0"/>
               <a:t>Host script files, </a:t>
             </a:r>
             <a:r>
@@ -17646,20 +17438,6 @@
               <a:rPr lang="en-US" dirty="0"/>
               <a:t>Non-ISVs can use Office 365 public CDN</a:t>
             </a:r>
-          </a:p>
-          <a:p>
-            <a:endParaRPr lang="en-US" dirty="0"/>
-          </a:p>
-          <a:p>
-            <a:r>
-              <a:rPr lang="en-US" dirty="0"/>
-              <a:t>Specify CDN in config/write-</a:t>
-            </a:r>
-            <a:r>
-              <a:rPr lang="en-US" dirty="0" err="1"/>
-              <a:t>manifests.json</a:t>
-            </a:r>
-            <a:endParaRPr lang="en-US" dirty="0"/>
           </a:p>
         </p:txBody>
       </p:sp>
@@ -17747,6 +17525,9 @@
             <a:endParaRPr lang="en-US" dirty="0"/>
           </a:p>
           <a:p>
+            <a:pPr marL="0" indent="0">
+              <a:buNone/>
+            </a:pPr>
             <a:r>
               <a:rPr lang="en-US" dirty="0"/>
               <a:t>Running gulp --ship will produce a bundle file for production:</a:t>
@@ -27349,22 +27130,22 @@
           <a:lstStyle/>
           <a:p>
             <a:r>
-              <a:rPr lang="en-US" dirty="0" smtClean="0"/>
+              <a:rPr lang="en-US" dirty="0"/>
               <a:t>follow up:</a:t>
             </a:r>
           </a:p>
           <a:p>
             <a:r>
-              <a:rPr lang="en-US" dirty="0" smtClean="0">
+              <a:rPr lang="en-US" dirty="0">
                 <a:hlinkClick r:id="rId2"/>
               </a:rPr>
               <a:t>shai@kwizcom.com</a:t>
             </a:r>
-            <a:endParaRPr lang="en-US" dirty="0" smtClean="0"/>
-          </a:p>
-          <a:p>
-            <a:r>
-              <a:rPr lang="en-US" dirty="0" err="1" smtClean="0"/>
+            <a:endParaRPr lang="en-US" dirty="0"/>
+          </a:p>
+          <a:p>
+            <a:r>
+              <a:rPr lang="en-US" dirty="0" err="1"/>
               <a:t>kwizcom.blogspot.com</a:t>
             </a:r>
             <a:endParaRPr lang="en-US" dirty="0"/>

</xml_diff>

<commit_message>
Updated presentation to 1.4
</commit_message>
<xml_diff>
--- a/SPFx ISV Insight.pptx
+++ b/SPFx ISV Insight.pptx
@@ -367,6 +367,10 @@
     </p:ext>
   </p:extLst>
 </p:presentation>
+</file>
+
+<file path=ppt/revisionInfo.xml><?xml version="1.0" encoding="utf-8"?>
+<p1510:revInfo xmlns:a="http://schemas.openxmlformats.org/drawingml/2006/main" xmlns:r="http://schemas.openxmlformats.org/officeDocument/2006/relationships" xmlns:p1510="http://schemas.microsoft.com/office/powerpoint/2015/10/main"/>
 </file>
 
 <file path=ppt/diagrams/colors1.xml><?xml version="1.0" encoding="utf-8"?>
@@ -5805,7 +5809,7 @@
           <a:p>
             <a:fld id="{71933532-7A6B-444F-BAAA-95C4DDC0F762}" type="datetimeFigureOut">
               <a:rPr lang="en-CA" smtClean="0"/>
-              <a:t>2017-09-25</a:t>
+              <a:t>2018-04-11</a:t>
             </a:fld>
             <a:endParaRPr lang="en-CA"/>
           </a:p>
@@ -6421,6 +6425,27 @@
               <a:t>A single web part can have more than one declaration with different default value. See react web part sample.</a:t>
             </a:r>
           </a:p>
+          <a:p>
+            <a:endParaRPr lang="en-US" dirty="0"/>
+          </a:p>
+          <a:p>
+            <a:r>
+              <a:rPr lang="en-US" dirty="0"/>
+              <a:t>Limitations:</a:t>
+            </a:r>
+          </a:p>
+          <a:p>
+            <a:r>
+              <a:rPr lang="en-US" dirty="0"/>
+              <a:t>Field customizer – only works in list view. missing new/view/edit form support.</a:t>
+            </a:r>
+          </a:p>
+          <a:p>
+            <a:r>
+              <a:rPr lang="en-US" dirty="0"/>
+              <a:t>Application customizer – loads only after the entire page content finished loading. You can basically have a JS file do what ever you want on the DOM but might be too late at this point if you want to hide stuff or re-order.</a:t>
+            </a:r>
+          </a:p>
         </p:txBody>
       </p:sp>
       <p:sp>
@@ -6541,18 +6566,50 @@
           <a:p>
             <a:r>
               <a:rPr lang="en-US" dirty="0"/>
-              <a:t>Why Office 365 is for non ISVs? Since ISV must have one predefined CDN address serving</a:t>
-            </a:r>
+              <a:t>Why Office 365 is for non ISVs? ISVs might benefit from having all customers point to one origin, so that they can push updates automatically in some cases without requiring customers to install a new package manually.</a:t>
+            </a:r>
+          </a:p>
+          <a:p>
+            <a:endParaRPr lang="en-US" baseline="0" dirty="0"/>
+          </a:p>
+          <a:p>
             <a:r>
               <a:rPr lang="en-US" baseline="0" dirty="0"/>
-              <a:t> unknown amount of users/tenants around the world.</a:t>
-            </a:r>
-          </a:p>
-          <a:p>
+              <a:t>As of </a:t>
+            </a:r>
+            <a:r>
+              <a:rPr lang="en-US" baseline="0" dirty="0" err="1"/>
+              <a:t>SPFx</a:t>
+            </a:r>
             <a:r>
               <a:rPr lang="en-US" baseline="0" dirty="0"/>
-              <a:t>Using Office 365 CDN will require them to rebuild the app package for each individual customer, or have all their customers running from their private tenant.</a:t>
-            </a:r>
+              <a:t> 1.4, </a:t>
+            </a:r>
+            <a:r>
+              <a:rPr lang="en-US" sz="1200" b="0" i="0" kern="1200" dirty="0" err="1">
+                <a:solidFill>
+                  <a:schemeClr val="tx1"/>
+                </a:solidFill>
+                <a:effectLst/>
+                <a:latin typeface="+mn-lt"/>
+                <a:ea typeface="+mn-ea"/>
+                <a:cs typeface="+mn-cs"/>
+              </a:rPr>
+              <a:t>includeClientSideAssets</a:t>
+            </a:r>
+            <a:r>
+              <a:rPr lang="en-US" sz="1200" b="0" i="0" kern="1200" dirty="0">
+                <a:solidFill>
+                  <a:schemeClr val="tx1"/>
+                </a:solidFill>
+                <a:effectLst/>
+                <a:latin typeface="+mn-lt"/>
+                <a:ea typeface="+mn-ea"/>
+                <a:cs typeface="+mn-cs"/>
+              </a:rPr>
+              <a:t> flag (on by default) negate the need for a CDN and will bundle up all artifact and deploy them automatically to your SPO CDN library or app catalog site if CDN option is not turned on.</a:t>
+            </a:r>
+            <a:endParaRPr lang="en-US" baseline="0" dirty="0"/>
           </a:p>
         </p:txBody>
       </p:sp>
@@ -7683,6 +7740,12 @@
           <a:p>
             <a:endParaRPr lang="en-US" dirty="0"/>
           </a:p>
+          <a:p>
+            <a:r>
+              <a:rPr lang="en-US" dirty="0"/>
+              <a:t>Note: if you added the published app to this site, as of 1.4 you will not be able to use the workbench on that same site. You will need to use the workbench on a different site.</a:t>
+            </a:r>
+          </a:p>
         </p:txBody>
       </p:sp>
       <p:sp>
@@ -7791,6 +7854,15 @@
           <a:p>
             <a:endParaRPr lang="en-US" dirty="0"/>
           </a:p>
+          <a:p>
+            <a:r>
+              <a:rPr lang="en-US" dirty="0"/>
+              <a:t>* From my experience, you can skip step 5 if you already added the app to your site. apps are updated in all your sites where used automatically.</a:t>
+            </a:r>
+          </a:p>
+          <a:p>
+            <a:endParaRPr lang="en-US" dirty="0"/>
+          </a:p>
         </p:txBody>
       </p:sp>
       <p:sp>
@@ -8495,8 +8567,57 @@
           </a:p>
           <a:p>
             <a:r>
-              <a:rPr lang="en-US" baseline="0"/>
+              <a:rPr lang="en-US" baseline="0" dirty="0"/>
               <a:t>More info: http://kwizcom.blogspot.ca/2017/07/spfx-project-breaking-after-moving-to.html</a:t>
+            </a:r>
+          </a:p>
+          <a:p>
+            <a:endParaRPr lang="en-US" baseline="0" dirty="0"/>
+          </a:p>
+          <a:p>
+            <a:r>
+              <a:rPr lang="en-US" baseline="0" dirty="0"/>
+              <a:t>Run </a:t>
+            </a:r>
+            <a:r>
+              <a:rPr lang="en-US" baseline="0" dirty="0" err="1"/>
+              <a:t>npm</a:t>
+            </a:r>
+            <a:r>
+              <a:rPr lang="en-US" baseline="0" dirty="0"/>
+              <a:t> </a:t>
+            </a:r>
+            <a:r>
+              <a:rPr lang="en-US" baseline="0" dirty="0" err="1"/>
+              <a:t>shrinkwrap</a:t>
+            </a:r>
+            <a:r>
+              <a:rPr lang="en-US" baseline="0" dirty="0"/>
+              <a:t> to keep the entire dependency tree of </a:t>
+            </a:r>
+            <a:r>
+              <a:rPr lang="en-US" baseline="0" dirty="0" err="1"/>
+              <a:t>npm</a:t>
+            </a:r>
+            <a:r>
+              <a:rPr lang="en-US" baseline="0" dirty="0"/>
+              <a:t> packages so that you know when other </a:t>
+            </a:r>
+            <a:r>
+              <a:rPr lang="en-US" baseline="0" dirty="0" err="1"/>
+              <a:t>devs</a:t>
+            </a:r>
+            <a:r>
+              <a:rPr lang="en-US" baseline="0" dirty="0"/>
+              <a:t> use it and run </a:t>
+            </a:r>
+            <a:r>
+              <a:rPr lang="en-US" baseline="0" dirty="0" err="1"/>
+              <a:t>npm</a:t>
+            </a:r>
+            <a:r>
+              <a:rPr lang="en-US" baseline="0" dirty="0"/>
+              <a:t> install they get exactly the same packages as you do.</a:t>
             </a:r>
           </a:p>
         </p:txBody>
@@ -8947,7 +9068,15 @@
           <a:p>
             <a:r>
               <a:rPr lang="en-US" dirty="0"/>
-              <a:t>One issue: since SP core classes are not installed globally, you might have to use any types to avoid type mismatch errors when using the same code in 2 or more projects</a:t>
+              <a:t>One issue: since SP core classes are not installed globally, you might have to use any types to avoid type mismatch errors when using the same code in 2 or more projects, especially if they each use different </a:t>
+            </a:r>
+            <a:r>
+              <a:rPr lang="en-US" dirty="0" err="1"/>
+              <a:t>SPFx</a:t>
+            </a:r>
+            <a:r>
+              <a:rPr lang="en-US" dirty="0"/>
+              <a:t> build version</a:t>
             </a:r>
           </a:p>
           <a:p>
@@ -9486,6 +9615,31 @@
           <a:p>
             <a:endParaRPr lang="en-US" dirty="0"/>
           </a:p>
+          <a:p>
+            <a:r>
+              <a:rPr lang="en-US" dirty="0"/>
+              <a:t>Instead of editing </a:t>
+            </a:r>
+            <a:r>
+              <a:rPr lang="en-US" dirty="0" err="1"/>
+              <a:t>package.json</a:t>
+            </a:r>
+            <a:r>
+              <a:rPr lang="en-US" dirty="0"/>
+              <a:t> manually, consider using “</a:t>
+            </a:r>
+            <a:r>
+              <a:rPr lang="en-US" dirty="0" err="1"/>
+              <a:t>npm</a:t>
+            </a:r>
+            <a:r>
+              <a:rPr lang="en-US" dirty="0"/>
+              <a:t> install {package}@{version} --save“ flag</a:t>
+            </a:r>
+          </a:p>
+          <a:p>
+            <a:endParaRPr lang="en-US" dirty="0"/>
+          </a:p>
         </p:txBody>
       </p:sp>
       <p:sp>
@@ -10674,6 +10828,12 @@
           <a:p>
             <a:endParaRPr lang="en-US" dirty="0"/>
           </a:p>
+          <a:p>
+            <a:r>
+              <a:rPr lang="en-US" dirty="0"/>
+              <a:t>* While upgrading is much better now, it is still far from perfect and in many cases still requires building a new package in the new version. Ex: http://kwizcom.blogspot.ca/2018/04/upgrading-spfx-react-from-110-to-140.html</a:t>
+            </a:r>
+          </a:p>
         </p:txBody>
       </p:sp>
       <p:sp>
@@ -10778,6 +10938,15 @@
               <a:t>Example: Fabric UI Core classes were updated and later pulled after they broke many web parts. Read more: https://github.com/SharePoint/sp-dev-docs/issues/325#issuecomment-315683738</a:t>
             </a:r>
           </a:p>
+          <a:p>
+            <a:endParaRPr lang="en-US" dirty="0"/>
+          </a:p>
+          <a:p>
+            <a:r>
+              <a:rPr lang="en-US" dirty="0"/>
+              <a:t>The process is very hard to debug in some cases, involves reading many lines of errors in the console output.</a:t>
+            </a:r>
+          </a:p>
         </p:txBody>
       </p:sp>
       <p:sp>
@@ -11684,7 +11853,15 @@
           <a:p>
             <a:r>
               <a:rPr lang="en-US" dirty="0"/>
-              <a:t>We will probably see support on premise in the future.</a:t>
+              <a:t>On </a:t>
+            </a:r>
+            <a:r>
+              <a:rPr lang="en-US" dirty="0" err="1"/>
+              <a:t>prem</a:t>
+            </a:r>
+            <a:r>
+              <a:rPr lang="en-US" dirty="0"/>
+              <a:t> supported on 2016, older build which only has web parts. </a:t>
             </a:r>
           </a:p>
           <a:p>
@@ -11710,8 +11887,27 @@
           <a:p>
             <a:r>
               <a:rPr lang="en-US" dirty="0"/>
-              <a:t>It is hard to build a complete solution in SPFx.</a:t>
-            </a:r>
+              <a:t>It is hard to build a complete solution in </a:t>
+            </a:r>
+            <a:r>
+              <a:rPr lang="en-US" dirty="0" err="1"/>
+              <a:t>SPFx</a:t>
+            </a:r>
+            <a:r>
+              <a:rPr lang="en-US" dirty="0"/>
+              <a:t>.</a:t>
+            </a:r>
+          </a:p>
+          <a:p>
+            <a:r>
+              <a:rPr lang="en-US" dirty="0"/>
+              <a:t>Missing lot of functionality: no custom column rendering, forms, mobile, </a:t>
+            </a:r>
+            <a:r>
+              <a:rPr lang="en-US" dirty="0" err="1"/>
+              <a:t>etc</a:t>
+            </a:r>
+            <a:endParaRPr lang="en-US" dirty="0"/>
           </a:p>
           <a:p>
             <a:r>
@@ -13179,7 +13375,7 @@
           <a:p>
             <a:fld id="{E13F4214-B2F9-482A-B8A4-237B2216D5B8}" type="datetimeFigureOut">
               <a:rPr lang="en-US" smtClean="0"/>
-              <a:t>9/25/2017</a:t>
+              <a:t>4/11/2018</a:t>
             </a:fld>
             <a:endParaRPr lang="en-US"/>
           </a:p>
@@ -15068,7 +15264,15 @@
             </a:pPr>
             <a:r>
               <a:rPr lang="en-US" dirty="0"/>
-              <a:t>SPO only</a:t>
+              <a:t>SPO: up-to-date - on </a:t>
+            </a:r>
+            <a:r>
+              <a:rPr lang="en-US" dirty="0" err="1"/>
+              <a:t>prem</a:t>
+            </a:r>
+            <a:r>
+              <a:rPr lang="en-US" dirty="0"/>
+              <a:t>: only 2016, older build</a:t>
             </a:r>
           </a:p>
           <a:p>
@@ -15090,7 +15294,7 @@
             </a:pPr>
             <a:r>
               <a:rPr lang="en-US" dirty="0"/>
-              <a:t>Only web parts (for now)</a:t>
+              <a:t>Limited artifact types supported</a:t>
             </a:r>
           </a:p>
           <a:p>
@@ -17157,7 +17361,7 @@
         <p:spPr/>
         <p:txBody>
           <a:bodyPr>
-            <a:normAutofit/>
+            <a:normAutofit lnSpcReduction="10000"/>
           </a:bodyPr>
           <a:lstStyle/>
           <a:p>
@@ -17172,16 +17376,29 @@
           <a:p>
             <a:r>
               <a:rPr lang="en-US" dirty="0"/>
-              <a:t>Currently only web parts are supported in production</a:t>
-            </a:r>
-          </a:p>
-          <a:p>
+              <a:t>Currently only web parts are supported on </a:t>
+            </a:r>
+            <a:r>
+              <a:rPr lang="en-US" dirty="0" err="1"/>
+              <a:t>prem</a:t>
+            </a:r>
             <a:endParaRPr lang="en-US" dirty="0"/>
           </a:p>
           <a:p>
-            <a:r>
-              <a:rPr lang="en-US" dirty="0"/>
-              <a:t>Each web part can have multiple declaration files</a:t>
+            <a:endParaRPr lang="en-US" dirty="0"/>
+          </a:p>
+          <a:p>
+            <a:r>
+              <a:rPr lang="en-US" dirty="0"/>
+              <a:t>Application Customizer, Field Customizer and </a:t>
+            </a:r>
+            <a:r>
+              <a:rPr lang="en-US" dirty="0" err="1"/>
+              <a:t>ListView</a:t>
+            </a:r>
+            <a:r>
+              <a:rPr lang="en-US" dirty="0"/>
+              <a:t> Command Set – very limited &amp; online only</a:t>
             </a:r>
           </a:p>
           <a:p>
@@ -17436,7 +17653,7 @@
           <a:p>
             <a:r>
               <a:rPr lang="en-US" dirty="0"/>
-              <a:t>Non-ISVs can use Office 365 public CDN</a:t>
+              <a:t>Non-ISVs on SPO can use Office 365 public CDN</a:t>
             </a:r>
           </a:p>
         </p:txBody>
@@ -17761,6 +17978,46 @@
               <a:rPr lang="en-US" dirty="0"/>
               <a:t>Drop your new JS to your CDN **</a:t>
             </a:r>
+          </a:p>
+        </p:txBody>
+      </p:sp>
+      <p:sp>
+        <p:nvSpPr>
+          <p:cNvPr id="4" name="TextBox 3">
+            <a:extLst>
+              <a:ext uri="{FF2B5EF4-FFF2-40B4-BE49-F238E27FC236}">
+                <a16:creationId xmlns:a16="http://schemas.microsoft.com/office/drawing/2014/main" id="{CE7CC024-5FAA-436E-A9A9-452F06BE24BD}"/>
+              </a:ext>
+            </a:extLst>
+          </p:cNvPr>
+          <p:cNvSpPr txBox="1"/>
+          <p:nvPr/>
+        </p:nvSpPr>
+        <p:spPr>
+          <a:xfrm>
+            <a:off x="7407627" y="5756831"/>
+            <a:ext cx="1736373" cy="369332"/>
+          </a:xfrm>
+          <a:prstGeom prst="rect">
+            <a:avLst/>
+          </a:prstGeom>
+          <a:noFill/>
+        </p:spPr>
+        <p:txBody>
+          <a:bodyPr wrap="none" rtlCol="0">
+            <a:spAutoFit/>
+          </a:bodyPr>
+          <a:lstStyle/>
+          <a:p>
+            <a:r>
+              <a:rPr lang="en-US" dirty="0">
+                <a:solidFill>
+                  <a:schemeClr val="accent3"/>
+                </a:solidFill>
+              </a:rPr>
+              <a:t>[optional steps]</a:t>
+            </a:r>
+            <a:endParaRPr lang="en-US" dirty="0"/>
           </a:p>
         </p:txBody>
       </p:sp>
@@ -18769,7 +19026,7 @@
             </a:pPr>
             <a:r>
               <a:rPr lang="en-US" dirty="0"/>
-              <a:t>Public to CDN</a:t>
+              <a:t>Publish to CDN</a:t>
             </a:r>
           </a:p>
           <a:p>
@@ -18789,7 +19046,7 @@
             </a:pPr>
             <a:r>
               <a:rPr lang="en-US" dirty="0"/>
-              <a:t>Add app to your site</a:t>
+              <a:t>Add app to your site*</a:t>
             </a:r>
           </a:p>
         </p:txBody>
@@ -20081,6 +20338,11 @@
               <a:rPr lang="en-US" dirty="0"/>
               <a:t> folder</a:t>
             </a:r>
+            <a:endParaRPr lang="en-US" dirty="0">
+              <a:solidFill>
+                <a:srgbClr val="92D050"/>
+              </a:solidFill>
+            </a:endParaRPr>
           </a:p>
           <a:p>
             <a:endParaRPr lang="en-US" dirty="0"/>
@@ -20105,8 +20367,41 @@
           <a:p>
             <a:r>
               <a:rPr lang="en-US" dirty="0"/>
-              <a:t>Dependencies change and your project may break as a result</a:t>
-            </a:r>
+              <a:t>Dependencies change and your project may break as a result - </a:t>
+            </a:r>
+            <a:r>
+              <a:rPr lang="en-US" dirty="0" err="1">
+                <a:solidFill>
+                  <a:srgbClr val="92D050"/>
+                </a:solidFill>
+              </a:rPr>
+              <a:t>npm</a:t>
+            </a:r>
+            <a:r>
+              <a:rPr lang="en-US" dirty="0">
+                <a:solidFill>
+                  <a:srgbClr val="92D050"/>
+                </a:solidFill>
+              </a:rPr>
+              <a:t> </a:t>
+            </a:r>
+            <a:r>
+              <a:rPr lang="en-US" dirty="0" err="1">
+                <a:solidFill>
+                  <a:srgbClr val="92D050"/>
+                </a:solidFill>
+              </a:rPr>
+              <a:t>shrinkwrap</a:t>
+            </a:r>
+            <a:r>
+              <a:rPr lang="en-US" dirty="0">
+                <a:solidFill>
+                  <a:srgbClr val="92D050"/>
+                </a:solidFill>
+              </a:rPr>
+              <a:t>!</a:t>
+            </a:r>
+            <a:endParaRPr lang="en-US" dirty="0"/>
           </a:p>
         </p:txBody>
       </p:sp>
@@ -21315,7 +21610,7 @@
           <a:p>
             <a:r>
               <a:rPr lang="en-US" dirty="0"/>
-              <a:t>You your code relatively to your project folder</a:t>
+              <a:t>Use your code relatively to your project folder</a:t>
             </a:r>
           </a:p>
         </p:txBody>
@@ -21434,7 +21729,7 @@
             </a:r>
             <a:r>
               <a:rPr lang="en-US" dirty="0"/>
-              <a:t>-core-library@~1.1.0</a:t>
+              <a:t>-core-library@~1.4.0</a:t>
             </a:r>
             <a:br>
               <a:rPr lang="en-US" dirty="0"/>
@@ -21469,7 +21764,7 @@
             </a:r>
             <a:r>
               <a:rPr lang="en-US" dirty="0"/>
-              <a:t>-base@~1.1.1</a:t>
+              <a:t>-base@~1.4.0</a:t>
             </a:r>
           </a:p>
           <a:p>
@@ -21498,7 +21793,7 @@
           <a:p>
             <a:r>
               <a:rPr lang="en-US" dirty="0"/>
-              <a:t>You your code relatively to your project folder</a:t>
+              <a:t>Use your code relatively to your project folder</a:t>
             </a:r>
           </a:p>
         </p:txBody>
@@ -21739,7 +22034,7 @@
           <a:p>
             <a:r>
               <a:rPr lang="en-US" b="1" dirty="0"/>
-              <a:t>You your code relatively to your project folder</a:t>
+              <a:t>Use your code relatively to your project folder</a:t>
             </a:r>
           </a:p>
           <a:p>
@@ -22881,7 +23176,17 @@
             </a:r>
             <a:r>
               <a:rPr lang="en-US" dirty="0"/>
-              <a:t> (available in developer preview)</a:t>
+              <a:t>/</a:t>
+            </a:r>
+            <a:r>
+              <a:rPr lang="en-US" dirty="0" err="1">
+                <a:hlinkClick r:id="rId4"/>
+              </a:rPr>
+              <a:t>MSGraphClient</a:t>
+            </a:r>
+            <a:r>
+              <a:rPr lang="en-US" dirty="0"/>
+              <a:t> (preview)</a:t>
             </a:r>
           </a:p>
           <a:p>
@@ -25044,7 +25349,7 @@
           <a:p>
             <a:r>
               <a:rPr lang="en-US" dirty="0"/>
-              <a:t>Promised this will stop after GA</a:t>
+              <a:t>Promised this will stop after GA *</a:t>
             </a:r>
           </a:p>
         </p:txBody>
@@ -27454,11 +27759,11 @@
           <a:p>
             <a:pPr lvl="1"/>
             <a:r>
-              <a:rPr lang="en-US" strike="sngStrike" dirty="0" err="1"/>
+              <a:rPr lang="en-US" dirty="0" err="1"/>
               <a:t>JSLink</a:t>
             </a:r>
             <a:r>
-              <a:rPr lang="en-US" strike="sngStrike" dirty="0"/>
+              <a:rPr lang="en-US" dirty="0"/>
               <a:t> / CSR No code sandbox solutions</a:t>
             </a:r>
           </a:p>
@@ -27471,6 +27776,82 @@
           </a:p>
         </p:txBody>
       </p:sp>
+      <p:cxnSp>
+        <p:nvCxnSpPr>
+          <p:cNvPr id="3" name="Straight Connector 2">
+            <a:extLst>
+              <a:ext uri="{FF2B5EF4-FFF2-40B4-BE49-F238E27FC236}">
+                <a16:creationId xmlns:a16="http://schemas.microsoft.com/office/drawing/2014/main" id="{DF8CC0B2-DB8B-49D5-91C9-61648967F3F1}"/>
+              </a:ext>
+            </a:extLst>
+          </p:cNvPr>
+          <p:cNvCxnSpPr/>
+          <p:nvPr/>
+        </p:nvCxnSpPr>
+        <p:spPr>
+          <a:xfrm>
+            <a:off x="5445760" y="5466080"/>
+            <a:ext cx="2956560" cy="0"/>
+          </a:xfrm>
+          <a:prstGeom prst="line">
+            <a:avLst/>
+          </a:prstGeom>
+          <a:ln w="19050"/>
+        </p:spPr>
+        <p:style>
+          <a:lnRef idx="1">
+            <a:schemeClr val="dk1"/>
+          </a:lnRef>
+          <a:fillRef idx="0">
+            <a:schemeClr val="dk1"/>
+          </a:fillRef>
+          <a:effectRef idx="0">
+            <a:schemeClr val="dk1"/>
+          </a:effectRef>
+          <a:fontRef idx="minor">
+            <a:schemeClr val="tx1"/>
+          </a:fontRef>
+        </p:style>
+      </p:cxnSp>
+      <p:cxnSp>
+        <p:nvCxnSpPr>
+          <p:cNvPr id="7" name="Straight Connector 6">
+            <a:extLst>
+              <a:ext uri="{FF2B5EF4-FFF2-40B4-BE49-F238E27FC236}">
+                <a16:creationId xmlns:a16="http://schemas.microsoft.com/office/drawing/2014/main" id="{F699D76A-F94C-4A9E-AFD9-5F25EF81A185}"/>
+              </a:ext>
+            </a:extLst>
+          </p:cNvPr>
+          <p:cNvCxnSpPr>
+            <a:cxnSpLocks/>
+          </p:cNvCxnSpPr>
+          <p:nvPr/>
+        </p:nvCxnSpPr>
+        <p:spPr>
+          <a:xfrm>
+            <a:off x="5445760" y="5709920"/>
+            <a:ext cx="924560" cy="0"/>
+          </a:xfrm>
+          <a:prstGeom prst="line">
+            <a:avLst/>
+          </a:prstGeom>
+          <a:ln w="19050"/>
+        </p:spPr>
+        <p:style>
+          <a:lnRef idx="1">
+            <a:schemeClr val="dk1"/>
+          </a:lnRef>
+          <a:fillRef idx="0">
+            <a:schemeClr val="dk1"/>
+          </a:fillRef>
+          <a:effectRef idx="0">
+            <a:schemeClr val="dk1"/>
+          </a:effectRef>
+          <a:fontRef idx="minor">
+            <a:schemeClr val="tx1"/>
+          </a:fontRef>
+        </p:style>
+      </p:cxnSp>
     </p:spTree>
     <p:extLst>
       <p:ext uri="{BB962C8B-B14F-4D97-AF65-F5344CB8AC3E}">
@@ -27484,6 +27865,127 @@
   <p:transition spd="slow">
     <p:wipe/>
   </p:transition>
+  <p:timing>
+    <p:tnLst>
+      <p:par>
+        <p:cTn id="1" dur="indefinite" restart="never" nodeType="tmRoot">
+          <p:childTnLst>
+            <p:seq concurrent="1" nextAc="seek">
+              <p:cTn id="2" dur="indefinite" nodeType="mainSeq">
+                <p:childTnLst>
+                  <p:par>
+                    <p:cTn id="3" fill="hold">
+                      <p:stCondLst>
+                        <p:cond delay="indefinite"/>
+                        <p:cond evt="onBegin" delay="0">
+                          <p:tn val="2"/>
+                        </p:cond>
+                      </p:stCondLst>
+                      <p:childTnLst>
+                        <p:par>
+                          <p:cTn id="4" fill="hold">
+                            <p:stCondLst>
+                              <p:cond delay="0"/>
+                            </p:stCondLst>
+                            <p:childTnLst>
+                              <p:par>
+                                <p:cTn id="5" presetID="10" presetClass="entr" presetSubtype="0" fill="hold" nodeType="afterEffect">
+                                  <p:stCondLst>
+                                    <p:cond delay="500"/>
+                                  </p:stCondLst>
+                                  <p:childTnLst>
+                                    <p:set>
+                                      <p:cBhvr>
+                                        <p:cTn id="6" dur="1" fill="hold">
+                                          <p:stCondLst>
+                                            <p:cond delay="0"/>
+                                          </p:stCondLst>
+                                        </p:cTn>
+                                        <p:tgtEl>
+                                          <p:spTgt spid="7"/>
+                                        </p:tgtEl>
+                                        <p:attrNameLst>
+                                          <p:attrName>style.visibility</p:attrName>
+                                        </p:attrNameLst>
+                                      </p:cBhvr>
+                                      <p:to>
+                                        <p:strVal val="visible"/>
+                                      </p:to>
+                                    </p:set>
+                                    <p:animEffect transition="in" filter="fade">
+                                      <p:cBhvr>
+                                        <p:cTn id="7" dur="500"/>
+                                        <p:tgtEl>
+                                          <p:spTgt spid="7"/>
+                                        </p:tgtEl>
+                                      </p:cBhvr>
+                                    </p:animEffect>
+                                  </p:childTnLst>
+                                </p:cTn>
+                              </p:par>
+                              <p:par>
+                                <p:cTn id="8" presetID="10" presetClass="entr" presetSubtype="0" fill="hold" nodeType="withEffect">
+                                  <p:stCondLst>
+                                    <p:cond delay="500"/>
+                                  </p:stCondLst>
+                                  <p:childTnLst>
+                                    <p:set>
+                                      <p:cBhvr>
+                                        <p:cTn id="9" dur="1" fill="hold">
+                                          <p:stCondLst>
+                                            <p:cond delay="0"/>
+                                          </p:stCondLst>
+                                        </p:cTn>
+                                        <p:tgtEl>
+                                          <p:spTgt spid="3"/>
+                                        </p:tgtEl>
+                                        <p:attrNameLst>
+                                          <p:attrName>style.visibility</p:attrName>
+                                        </p:attrNameLst>
+                                      </p:cBhvr>
+                                      <p:to>
+                                        <p:strVal val="visible"/>
+                                      </p:to>
+                                    </p:set>
+                                    <p:animEffect transition="in" filter="fade">
+                                      <p:cBhvr>
+                                        <p:cTn id="10" dur="500"/>
+                                        <p:tgtEl>
+                                          <p:spTgt spid="3"/>
+                                        </p:tgtEl>
+                                      </p:cBhvr>
+                                    </p:animEffect>
+                                  </p:childTnLst>
+                                </p:cTn>
+                              </p:par>
+                            </p:childTnLst>
+                          </p:cTn>
+                        </p:par>
+                      </p:childTnLst>
+                    </p:cTn>
+                  </p:par>
+                </p:childTnLst>
+              </p:cTn>
+              <p:prevCondLst>
+                <p:cond evt="onPrev" delay="0">
+                  <p:tgtEl>
+                    <p:sldTgt/>
+                  </p:tgtEl>
+                </p:cond>
+              </p:prevCondLst>
+              <p:nextCondLst>
+                <p:cond evt="onNext" delay="0">
+                  <p:tgtEl>
+                    <p:sldTgt/>
+                  </p:tgtEl>
+                </p:cond>
+              </p:nextCondLst>
+            </p:seq>
+          </p:childTnLst>
+        </p:cTn>
+      </p:par>
+    </p:tnLst>
+  </p:timing>
 </p:sld>
 </file>
 

</xml_diff>